<commit_message>
added some bullet points to ELT Pipeline slide
</commit_message>
<xml_diff>
--- a/DE2_Term_Presentation.pptx
+++ b/DE2_Term_Presentation.pptx
@@ -111,7 +111,64 @@
       </a:defRPr>
     </a:lvl9pPr>
   </p:defaultTextStyle>
+  <p:extLst>
+    <p:ext uri="{EFAFB233-063F-42B5-8137-9DF3F51BA10A}">
+      <p15:sldGuideLst xmlns:p15="http://schemas.microsoft.com/office/powerpoint/2012/main"/>
+    </p:ext>
+  </p:extLst>
 </p:presentation>
+</file>
+
+<file path=ppt/revisionInfo.xml><?xml version="1.0" encoding="utf-8"?>
+<p1510:revInfo xmlns:a="http://schemas.openxmlformats.org/drawingml/2006/main" xmlns:r="http://schemas.openxmlformats.org/officeDocument/2006/relationships" xmlns:p1510="http://schemas.microsoft.com/office/powerpoint/2015/10/main">
+  <p1510:revLst>
+    <p1510:client id="{710AC600-54DC-B942-8EBA-223E84510A54}" v="1" dt="2020-12-09T21:29:41.837"/>
+  </p1510:revLst>
+</p1510:revInfo>
+</file>
+
+<file path=ppt/changesInfos/changesInfo1.xml><?xml version="1.0" encoding="utf-8"?>
+<pc:chgInfo xmlns:a="http://schemas.openxmlformats.org/drawingml/2006/main" xmlns:r="http://schemas.openxmlformats.org/officeDocument/2006/relationships" xmlns:ac="http://schemas.microsoft.com/office/drawing/2013/main/command" xmlns:pc="http://schemas.microsoft.com/office/powerpoint/2013/main/command">
+  <pc:docChgLst>
+    <pc:chgData name="Terez Szabo" userId="42e7e467-1161-451a-9926-179cfa22533b" providerId="ADAL" clId="{710AC600-54DC-B942-8EBA-223E84510A54}"/>
+    <pc:docChg chg="modSld">
+      <pc:chgData name="Terez Szabo" userId="42e7e467-1161-451a-9926-179cfa22533b" providerId="ADAL" clId="{710AC600-54DC-B942-8EBA-223E84510A54}" dt="2020-12-09T21:29:48.044" v="138" actId="20577"/>
+      <pc:docMkLst>
+        <pc:docMk/>
+      </pc:docMkLst>
+      <pc:sldChg chg="modSp mod">
+        <pc:chgData name="Terez Szabo" userId="42e7e467-1161-451a-9926-179cfa22533b" providerId="ADAL" clId="{710AC600-54DC-B942-8EBA-223E84510A54}" dt="2020-12-09T21:29:00.078" v="128" actId="20577"/>
+        <pc:sldMkLst>
+          <pc:docMk/>
+          <pc:sldMk cId="799758839" sldId="258"/>
+        </pc:sldMkLst>
+        <pc:spChg chg="mod">
+          <ac:chgData name="Terez Szabo" userId="42e7e467-1161-451a-9926-179cfa22533b" providerId="ADAL" clId="{710AC600-54DC-B942-8EBA-223E84510A54}" dt="2020-12-09T21:29:00.078" v="128" actId="20577"/>
+          <ac:spMkLst>
+            <pc:docMk/>
+            <pc:sldMk cId="799758839" sldId="258"/>
+            <ac:spMk id="3" creationId="{5DC56CEF-023A-D148-B143-8321A08ECC09}"/>
+          </ac:spMkLst>
+        </pc:spChg>
+      </pc:sldChg>
+      <pc:sldChg chg="modSp mod">
+        <pc:chgData name="Terez Szabo" userId="42e7e467-1161-451a-9926-179cfa22533b" providerId="ADAL" clId="{710AC600-54DC-B942-8EBA-223E84510A54}" dt="2020-12-09T21:29:48.044" v="138" actId="20577"/>
+        <pc:sldMkLst>
+          <pc:docMk/>
+          <pc:sldMk cId="3587188991" sldId="259"/>
+        </pc:sldMkLst>
+        <pc:spChg chg="mod">
+          <ac:chgData name="Terez Szabo" userId="42e7e467-1161-451a-9926-179cfa22533b" providerId="ADAL" clId="{710AC600-54DC-B942-8EBA-223E84510A54}" dt="2020-12-09T21:29:48.044" v="138" actId="20577"/>
+          <ac:spMkLst>
+            <pc:docMk/>
+            <pc:sldMk cId="3587188991" sldId="259"/>
+            <ac:spMk id="3" creationId="{50374378-1AB9-1747-AC27-6AB5640650FD}"/>
+          </ac:spMkLst>
+        </pc:spChg>
+      </pc:sldChg>
+    </pc:docChg>
+  </pc:docChgLst>
+</pc:chgInfo>
 </file>
 
 <file path=ppt/slideLayouts/slideLayout1.xml><?xml version="1.0" encoding="utf-8"?>
@@ -6202,7 +6259,7 @@
           <a:p>
             <a:r>
               <a:rPr lang="en-CH" dirty="0"/>
-              <a:t>The World Development Indicators (WDIs) were loaded directly into Knime using the API extraction</a:t>
+              <a:t>The World Development Indicators (WDIs) were loaded directly into KNIME using the API extraction</a:t>
             </a:r>
           </a:p>
           <a:p>
@@ -6297,7 +6354,42 @@
           <a:bodyPr/>
           <a:lstStyle/>
           <a:p>
-            <a:endParaRPr lang="en-CH"/>
+            <a:r>
+              <a:rPr lang="en-CH" dirty="0"/>
+              <a:t>Filtered country code maping column</a:t>
+            </a:r>
+          </a:p>
+          <a:p>
+            <a:r>
+              <a:rPr lang="en-CH" dirty="0"/>
+              <a:t>Joined the table with the country code</a:t>
+            </a:r>
+          </a:p>
+          <a:p>
+            <a:r>
+              <a:rPr lang="en-CH" dirty="0"/>
+              <a:t>Variables in KNIME</a:t>
+            </a:r>
+          </a:p>
+          <a:p>
+            <a:r>
+              <a:rPr lang="en-GB" dirty="0"/>
+              <a:t>World </a:t>
+            </a:r>
+            <a:r>
+              <a:rPr lang="en-GB"/>
+              <a:t>bank API </a:t>
+            </a:r>
+            <a:r>
+              <a:rPr lang="en-GB" dirty="0"/>
+              <a:t>implementation until  the join after the loop ending including data wrangling problems and decisions</a:t>
+            </a:r>
+          </a:p>
+          <a:p>
+            <a:endParaRPr lang="en-CH" dirty="0"/>
+          </a:p>
+          <a:p>
+            <a:endParaRPr lang="en-CH" dirty="0"/>
           </a:p>
         </p:txBody>
       </p:sp>

</xml_diff>

<commit_message>
added some more visuals to the ppt
</commit_message>
<xml_diff>
--- a/DE2_Term_Presentation.pptx
+++ b/DE2_Term_Presentation.pptx
@@ -5,7 +5,7 @@
     <p:sldMasterId id="2147483686" r:id="rId1"/>
   </p:sldMasterIdLst>
   <p:notesMasterIdLst>
-    <p:notesMasterId r:id="rId17"/>
+    <p:notesMasterId r:id="rId16"/>
   </p:notesMasterIdLst>
   <p:sldIdLst>
     <p:sldId id="256" r:id="rId2"/>
@@ -16,13 +16,12 @@
     <p:sldId id="260" r:id="rId7"/>
     <p:sldId id="265" r:id="rId8"/>
     <p:sldId id="266" r:id="rId9"/>
-    <p:sldId id="262" r:id="rId10"/>
-    <p:sldId id="268" r:id="rId11"/>
-    <p:sldId id="270" r:id="rId12"/>
-    <p:sldId id="267" r:id="rId13"/>
-    <p:sldId id="263" r:id="rId14"/>
-    <p:sldId id="261" r:id="rId15"/>
-    <p:sldId id="269" r:id="rId16"/>
+    <p:sldId id="268" r:id="rId10"/>
+    <p:sldId id="270" r:id="rId11"/>
+    <p:sldId id="267" r:id="rId12"/>
+    <p:sldId id="261" r:id="rId13"/>
+    <p:sldId id="269" r:id="rId14"/>
+    <p:sldId id="273" r:id="rId15"/>
   </p:sldIdLst>
   <p:sldSz cx="12192000" cy="6858000"/>
   <p:notesSz cx="6858000" cy="9144000"/>
@@ -132,9 +131,202 @@
 <file path=ppt/revisionInfo.xml><?xml version="1.0" encoding="utf-8"?>
 <p1510:revInfo xmlns:a="http://schemas.openxmlformats.org/drawingml/2006/main" xmlns:r="http://schemas.openxmlformats.org/officeDocument/2006/relationships" xmlns:p1510="http://schemas.microsoft.com/office/powerpoint/2015/10/main">
   <p1510:revLst>
-    <p1510:client id="{710AC600-54DC-B942-8EBA-223E84510A54}" v="18" dt="2020-12-11T13:48:43.325"/>
+    <p1510:client id="{710AC600-54DC-B942-8EBA-223E84510A54}" v="22" dt="2020-12-11T16:30:13.994"/>
   </p1510:revLst>
 </p1510:revInfo>
+</file>
+
+<file path=ppt/changesInfos/changesInfo1.xml><?xml version="1.0" encoding="utf-8"?>
+<pc:chgInfo xmlns:a="http://schemas.openxmlformats.org/drawingml/2006/main" xmlns:r="http://schemas.openxmlformats.org/officeDocument/2006/relationships" xmlns:ac="http://schemas.microsoft.com/office/drawing/2013/main/command" xmlns:pc="http://schemas.microsoft.com/office/powerpoint/2013/main/command">
+  <pc:docChgLst>
+    <pc:chgData name="Terez Szabo" userId="42e7e467-1161-451a-9926-179cfa22533b" providerId="ADAL" clId="{710AC600-54DC-B942-8EBA-223E84510A54}"/>
+    <pc:docChg chg="custSel mod addSld delSld modSld">
+      <pc:chgData name="Terez Szabo" userId="42e7e467-1161-451a-9926-179cfa22533b" providerId="ADAL" clId="{710AC600-54DC-B942-8EBA-223E84510A54}" dt="2020-12-11T16:31:02.763" v="82" actId="26606"/>
+      <pc:docMkLst>
+        <pc:docMk/>
+      </pc:docMkLst>
+      <pc:sldChg chg="modSp del mod">
+        <pc:chgData name="Terez Szabo" userId="42e7e467-1161-451a-9926-179cfa22533b" providerId="ADAL" clId="{710AC600-54DC-B942-8EBA-223E84510A54}" dt="2020-12-11T16:30:19.177" v="51" actId="2696"/>
+        <pc:sldMkLst>
+          <pc:docMk/>
+          <pc:sldMk cId="1311002320" sldId="262"/>
+        </pc:sldMkLst>
+        <pc:spChg chg="mod">
+          <ac:chgData name="Terez Szabo" userId="42e7e467-1161-451a-9926-179cfa22533b" providerId="ADAL" clId="{710AC600-54DC-B942-8EBA-223E84510A54}" dt="2020-12-11T16:30:06.742" v="50" actId="21"/>
+          <ac:spMkLst>
+            <pc:docMk/>
+            <pc:sldMk cId="1311002320" sldId="262"/>
+            <ac:spMk id="3" creationId="{79A9425A-062D-D545-A18A-44226D2EBAD3}"/>
+          </ac:spMkLst>
+        </pc:spChg>
+      </pc:sldChg>
+      <pc:sldChg chg="del">
+        <pc:chgData name="Terez Szabo" userId="42e7e467-1161-451a-9926-179cfa22533b" providerId="ADAL" clId="{710AC600-54DC-B942-8EBA-223E84510A54}" dt="2020-12-11T16:29:59.433" v="49" actId="2696"/>
+        <pc:sldMkLst>
+          <pc:docMk/>
+          <pc:sldMk cId="103008590" sldId="263"/>
+        </pc:sldMkLst>
+      </pc:sldChg>
+      <pc:sldChg chg="addSp modSp mod">
+        <pc:chgData name="Terez Szabo" userId="42e7e467-1161-451a-9926-179cfa22533b" providerId="ADAL" clId="{710AC600-54DC-B942-8EBA-223E84510A54}" dt="2020-12-11T16:25:18.471" v="10" actId="14100"/>
+        <pc:sldMkLst>
+          <pc:docMk/>
+          <pc:sldMk cId="2458617161" sldId="267"/>
+        </pc:sldMkLst>
+        <pc:picChg chg="add mod">
+          <ac:chgData name="Terez Szabo" userId="42e7e467-1161-451a-9926-179cfa22533b" providerId="ADAL" clId="{710AC600-54DC-B942-8EBA-223E84510A54}" dt="2020-12-11T16:25:18.471" v="10" actId="14100"/>
+          <ac:picMkLst>
+            <pc:docMk/>
+            <pc:sldMk cId="2458617161" sldId="267"/>
+            <ac:picMk id="3" creationId="{282910C1-8698-8444-99A4-517451E2B95A}"/>
+          </ac:picMkLst>
+        </pc:picChg>
+        <pc:picChg chg="mod">
+          <ac:chgData name="Terez Szabo" userId="42e7e467-1161-451a-9926-179cfa22533b" providerId="ADAL" clId="{710AC600-54DC-B942-8EBA-223E84510A54}" dt="2020-12-11T16:25:14.968" v="9" actId="14100"/>
+          <ac:picMkLst>
+            <pc:docMk/>
+            <pc:sldMk cId="2458617161" sldId="267"/>
+            <ac:picMk id="10" creationId="{A00C5D16-95A8-D843-AA2E-5BDB4CFB0C55}"/>
+          </ac:picMkLst>
+        </pc:picChg>
+      </pc:sldChg>
+      <pc:sldChg chg="addSp delSp modSp mod">
+        <pc:chgData name="Terez Szabo" userId="42e7e467-1161-451a-9926-179cfa22533b" providerId="ADAL" clId="{710AC600-54DC-B942-8EBA-223E84510A54}" dt="2020-12-11T16:29:50.288" v="48" actId="14100"/>
+        <pc:sldMkLst>
+          <pc:docMk/>
+          <pc:sldMk cId="1974929923" sldId="269"/>
+        </pc:sldMkLst>
+        <pc:spChg chg="mod">
+          <ac:chgData name="Terez Szabo" userId="42e7e467-1161-451a-9926-179cfa22533b" providerId="ADAL" clId="{710AC600-54DC-B942-8EBA-223E84510A54}" dt="2020-12-11T16:29:43.529" v="46" actId="14100"/>
+          <ac:spMkLst>
+            <pc:docMk/>
+            <pc:sldMk cId="1974929923" sldId="269"/>
+            <ac:spMk id="2" creationId="{5D509755-BF9E-4045-9B1F-A4B620116FAA}"/>
+          </ac:spMkLst>
+        </pc:spChg>
+        <pc:spChg chg="add del mod">
+          <ac:chgData name="Terez Szabo" userId="42e7e467-1161-451a-9926-179cfa22533b" providerId="ADAL" clId="{710AC600-54DC-B942-8EBA-223E84510A54}" dt="2020-12-11T16:29:39.191" v="45" actId="478"/>
+          <ac:spMkLst>
+            <pc:docMk/>
+            <pc:sldMk cId="1974929923" sldId="269"/>
+            <ac:spMk id="6" creationId="{8A25F9FF-78F3-6246-8584-0CA9C57FAFF4}"/>
+          </ac:spMkLst>
+        </pc:spChg>
+        <pc:spChg chg="del">
+          <ac:chgData name="Terez Szabo" userId="42e7e467-1161-451a-9926-179cfa22533b" providerId="ADAL" clId="{710AC600-54DC-B942-8EBA-223E84510A54}" dt="2020-12-11T16:25:35.342" v="11" actId="931"/>
+          <ac:spMkLst>
+            <pc:docMk/>
+            <pc:sldMk cId="1974929923" sldId="269"/>
+            <ac:spMk id="7" creationId="{46C7DCB7-F220-E740-848D-A1693EBB584E}"/>
+          </ac:spMkLst>
+        </pc:spChg>
+        <pc:picChg chg="add mod">
+          <ac:chgData name="Terez Szabo" userId="42e7e467-1161-451a-9926-179cfa22533b" providerId="ADAL" clId="{710AC600-54DC-B942-8EBA-223E84510A54}" dt="2020-12-11T16:29:50.288" v="48" actId="14100"/>
+          <ac:picMkLst>
+            <pc:docMk/>
+            <pc:sldMk cId="1974929923" sldId="269"/>
+            <ac:picMk id="4" creationId="{0295FF91-841B-064B-AD8C-1D4D0F60FCF6}"/>
+          </ac:picMkLst>
+        </pc:picChg>
+      </pc:sldChg>
+      <pc:sldChg chg="addSp delSp modSp new mod setBg">
+        <pc:chgData name="Terez Szabo" userId="42e7e467-1161-451a-9926-179cfa22533b" providerId="ADAL" clId="{710AC600-54DC-B942-8EBA-223E84510A54}" dt="2020-12-11T16:31:02.763" v="82" actId="26606"/>
+        <pc:sldMkLst>
+          <pc:docMk/>
+          <pc:sldMk cId="4063716037" sldId="273"/>
+        </pc:sldMkLst>
+        <pc:spChg chg="mod">
+          <ac:chgData name="Terez Szabo" userId="42e7e467-1161-451a-9926-179cfa22533b" providerId="ADAL" clId="{710AC600-54DC-B942-8EBA-223E84510A54}" dt="2020-12-11T16:31:02.763" v="82" actId="26606"/>
+          <ac:spMkLst>
+            <pc:docMk/>
+            <pc:sldMk cId="4063716037" sldId="273"/>
+            <ac:spMk id="2" creationId="{4D2BA7B0-75C8-A24B-8ED1-93421206F4FB}"/>
+          </ac:spMkLst>
+        </pc:spChg>
+        <pc:spChg chg="del">
+          <ac:chgData name="Terez Szabo" userId="42e7e467-1161-451a-9926-179cfa22533b" providerId="ADAL" clId="{710AC600-54DC-B942-8EBA-223E84510A54}" dt="2020-12-11T16:30:42.242" v="53" actId="26606"/>
+          <ac:spMkLst>
+            <pc:docMk/>
+            <pc:sldMk cId="4063716037" sldId="273"/>
+            <ac:spMk id="3" creationId="{84AEEA6C-2031-7248-B74C-ACD946BE9C32}"/>
+          </ac:spMkLst>
+        </pc:spChg>
+        <pc:spChg chg="add del">
+          <ac:chgData name="Terez Szabo" userId="42e7e467-1161-451a-9926-179cfa22533b" providerId="ADAL" clId="{710AC600-54DC-B942-8EBA-223E84510A54}" dt="2020-12-11T16:31:02.763" v="82" actId="26606"/>
+          <ac:spMkLst>
+            <pc:docMk/>
+            <pc:sldMk cId="4063716037" sldId="273"/>
+            <ac:spMk id="16" creationId="{3011B0B3-5679-4759-90B8-3B908C4CBD21}"/>
+          </ac:spMkLst>
+        </pc:spChg>
+        <pc:spChg chg="add">
+          <ac:chgData name="Terez Szabo" userId="42e7e467-1161-451a-9926-179cfa22533b" providerId="ADAL" clId="{710AC600-54DC-B942-8EBA-223E84510A54}" dt="2020-12-11T16:31:02.763" v="82" actId="26606"/>
+          <ac:spMkLst>
+            <pc:docMk/>
+            <pc:sldMk cId="4063716037" sldId="273"/>
+            <ac:spMk id="32" creationId="{CA5B2A81-2C8E-4963-AFD4-E539D168B475}"/>
+          </ac:spMkLst>
+        </pc:spChg>
+        <pc:grpChg chg="add del">
+          <ac:chgData name="Terez Szabo" userId="42e7e467-1161-451a-9926-179cfa22533b" providerId="ADAL" clId="{710AC600-54DC-B942-8EBA-223E84510A54}" dt="2020-12-11T16:31:02.763" v="82" actId="26606"/>
+          <ac:grpSpMkLst>
+            <pc:docMk/>
+            <pc:sldMk cId="4063716037" sldId="273"/>
+            <ac:grpSpMk id="10" creationId="{F982E0B2-AA9C-441C-A08E-A9DF9CF12116}"/>
+          </ac:grpSpMkLst>
+        </pc:grpChg>
+        <pc:grpChg chg="add">
+          <ac:chgData name="Terez Szabo" userId="42e7e467-1161-451a-9926-179cfa22533b" providerId="ADAL" clId="{710AC600-54DC-B942-8EBA-223E84510A54}" dt="2020-12-11T16:31:02.763" v="82" actId="26606"/>
+          <ac:grpSpMkLst>
+            <pc:docMk/>
+            <pc:sldMk cId="4063716037" sldId="273"/>
+            <ac:grpSpMk id="26" creationId="{F982E0B2-AA9C-441C-A08E-A9DF9CF12116}"/>
+          </ac:grpSpMkLst>
+        </pc:grpChg>
+        <pc:picChg chg="add">
+          <ac:chgData name="Terez Szabo" userId="42e7e467-1161-451a-9926-179cfa22533b" providerId="ADAL" clId="{710AC600-54DC-B942-8EBA-223E84510A54}" dt="2020-12-11T16:31:02.763" v="82" actId="26606"/>
+          <ac:picMkLst>
+            <pc:docMk/>
+            <pc:sldMk cId="4063716037" sldId="273"/>
+            <ac:picMk id="20" creationId="{28141A80-C3AD-4429-A37F-C38271D461F5}"/>
+          </ac:picMkLst>
+        </pc:picChg>
+        <pc:cxnChg chg="add del">
+          <ac:chgData name="Terez Szabo" userId="42e7e467-1161-451a-9926-179cfa22533b" providerId="ADAL" clId="{710AC600-54DC-B942-8EBA-223E84510A54}" dt="2020-12-11T16:31:02.763" v="82" actId="26606"/>
+          <ac:cxnSpMkLst>
+            <pc:docMk/>
+            <pc:sldMk cId="4063716037" sldId="273"/>
+            <ac:cxnSpMk id="8" creationId="{701C0CAB-6A03-4C6A-9FAA-219847753628}"/>
+          </ac:cxnSpMkLst>
+        </pc:cxnChg>
+        <pc:cxnChg chg="add del">
+          <ac:chgData name="Terez Szabo" userId="42e7e467-1161-451a-9926-179cfa22533b" providerId="ADAL" clId="{710AC600-54DC-B942-8EBA-223E84510A54}" dt="2020-12-11T16:31:02.763" v="82" actId="26606"/>
+          <ac:cxnSpMkLst>
+            <pc:docMk/>
+            <pc:sldMk cId="4063716037" sldId="273"/>
+            <ac:cxnSpMk id="18" creationId="{32E97E5C-7A5F-424E-AAE4-654396E90799}"/>
+          </ac:cxnSpMkLst>
+        </pc:cxnChg>
+        <pc:cxnChg chg="add">
+          <ac:chgData name="Terez Szabo" userId="42e7e467-1161-451a-9926-179cfa22533b" providerId="ADAL" clId="{710AC600-54DC-B942-8EBA-223E84510A54}" dt="2020-12-11T16:31:02.763" v="82" actId="26606"/>
+          <ac:cxnSpMkLst>
+            <pc:docMk/>
+            <pc:sldMk cId="4063716037" sldId="273"/>
+            <ac:cxnSpMk id="24" creationId="{701C0CAB-6A03-4C6A-9FAA-219847753628}"/>
+          </ac:cxnSpMkLst>
+        </pc:cxnChg>
+        <pc:cxnChg chg="add">
+          <ac:chgData name="Terez Szabo" userId="42e7e467-1161-451a-9926-179cfa22533b" providerId="ADAL" clId="{710AC600-54DC-B942-8EBA-223E84510A54}" dt="2020-12-11T16:31:02.763" v="82" actId="26606"/>
+          <ac:cxnSpMkLst>
+            <pc:docMk/>
+            <pc:sldMk cId="4063716037" sldId="273"/>
+            <ac:cxnSpMk id="34" creationId="{9E7C23BC-DAA6-40E1-8166-B8C4439D1430}"/>
+          </ac:cxnSpMkLst>
+        </pc:cxnChg>
+      </pc:sldChg>
+    </pc:docChg>
+  </pc:docChgLst>
+</pc:chgInfo>
 </file>
 
 <file path=ppt/notesMasters/notesMaster1.xml><?xml version="1.0" encoding="utf-8"?>
@@ -219,7 +411,7 @@
           <a:p>
             <a:fld id="{295301A9-71AD-BD42-B443-DF4A4CA5BC7F}" type="datetimeFigureOut">
               <a:rPr lang="en-CH" smtClean="0"/>
-              <a:t>12/11/2020</a:t>
+              <a:t>11.12.20</a:t>
             </a:fld>
             <a:endParaRPr lang="en-CH"/>
           </a:p>
@@ -783,6 +975,29 @@
           <a:bodyPr/>
           <a:lstStyle/>
           <a:p>
+            <a:r>
+              <a:rPr lang="en-CH" sz="1100" dirty="0"/>
+              <a:t>Some of the variables had a division by gender</a:t>
+            </a:r>
+          </a:p>
+          <a:p>
+            <a:r>
+              <a:rPr lang="en-CH" sz="1100" dirty="0"/>
+              <a:t>Smoking has no correlation to number of suicides</a:t>
+            </a:r>
+          </a:p>
+          <a:p>
+            <a:pPr lvl="2"/>
+            <a:r>
+              <a:rPr lang="en-CH" sz="1100" dirty="0"/>
+              <a:t>Average smokers larger tandancy to commit suicid</a:t>
+            </a:r>
+            <a:r>
+              <a:rPr lang="fr-BE" sz="1100" dirty="0"/>
+              <a:t>e</a:t>
+            </a:r>
+          </a:p>
+          <a:p>
             <a:endParaRPr lang="en-CH" dirty="0"/>
           </a:p>
         </p:txBody>
@@ -813,7 +1028,7 @@
     </p:spTree>
     <p:extLst>
       <p:ext uri="{BB962C8B-B14F-4D97-AF65-F5344CB8AC3E}">
-        <p14:creationId xmlns:p14="http://schemas.microsoft.com/office/powerpoint/2010/main" val="2428797356"/>
+        <p14:creationId xmlns:p14="http://schemas.microsoft.com/office/powerpoint/2010/main" val="1996060125"/>
       </p:ext>
     </p:extLst>
   </p:cSld>
@@ -869,24 +1084,7 @@
           <a:p>
             <a:r>
               <a:rPr lang="en-CH" sz="1100" dirty="0"/>
-              <a:t>Some of the variables had a division by gender</a:t>
-            </a:r>
-          </a:p>
-          <a:p>
-            <a:r>
-              <a:rPr lang="en-CH" sz="1100" dirty="0"/>
-              <a:t>Smoking has no correlation to number of suicides</a:t>
-            </a:r>
-          </a:p>
-          <a:p>
-            <a:pPr lvl="2"/>
-            <a:r>
-              <a:rPr lang="en-CH" sz="1100" dirty="0"/>
-              <a:t>Average smokers larger tandancy to commit suicid</a:t>
-            </a:r>
-            <a:r>
-              <a:rPr lang="fr-BE" sz="1100" dirty="0"/>
-              <a:t>e</a:t>
+              <a:t>There is a small amount of correlation between unemployment and number of suicides but almost neglegable</a:t>
             </a:r>
           </a:p>
           <a:p>
@@ -920,7 +1118,7 @@
     </p:spTree>
     <p:extLst>
       <p:ext uri="{BB962C8B-B14F-4D97-AF65-F5344CB8AC3E}">
-        <p14:creationId xmlns:p14="http://schemas.microsoft.com/office/powerpoint/2010/main" val="1996060125"/>
+        <p14:creationId xmlns:p14="http://schemas.microsoft.com/office/powerpoint/2010/main" val="1207234545"/>
       </p:ext>
     </p:extLst>
   </p:cSld>
@@ -975,9 +1173,18 @@
           <a:lstStyle/>
           <a:p>
             <a:r>
-              <a:rPr lang="en-CH" sz="1100" dirty="0"/>
-              <a:t>There is a small amount of correlation between unemployment and number of suicides but almost neglegable</a:t>
-            </a:r>
+              <a:rPr lang="en-GB" dirty="0"/>
+              <a:t>For alcohol we decided to do a log-log analysis</a:t>
+            </a:r>
+            <a:endParaRPr lang="en-CH" dirty="0"/>
+          </a:p>
+          <a:p>
+            <a:pPr lvl="2"/>
+            <a:r>
+              <a:rPr lang="en-CH" dirty="0"/>
+              <a:t>Definite correlation between alcohol consumption and suicide rate</a:t>
+            </a:r>
+            <a:endParaRPr lang="en-GB" dirty="0"/>
           </a:p>
           <a:p>
             <a:endParaRPr lang="en-CH" dirty="0"/>
@@ -1010,7 +1217,7 @@
     </p:spTree>
     <p:extLst>
       <p:ext uri="{BB962C8B-B14F-4D97-AF65-F5344CB8AC3E}">
-        <p14:creationId xmlns:p14="http://schemas.microsoft.com/office/powerpoint/2010/main" val="1207234545"/>
+        <p14:creationId xmlns:p14="http://schemas.microsoft.com/office/powerpoint/2010/main" val="2268506682"/>
       </p:ext>
     </p:extLst>
   </p:cSld>
@@ -1098,7 +1305,7 @@
           <a:p>
             <a:fld id="{E6E8B6E9-C291-3B4B-AE9B-9D2ED4D32F18}" type="slidenum">
               <a:rPr lang="en-CH" smtClean="0"/>
-              <a:t>15</a:t>
+              <a:t>13</a:t>
             </a:fld>
             <a:endParaRPr lang="en-CH"/>
           </a:p>
@@ -1276,7 +1483,7 @@
           <a:p>
             <a:fld id="{64F0E216-BA48-4F04-AC4F-645AA0DD6AC6}" type="datetimeFigureOut">
               <a:rPr lang="en-US" smtClean="0"/>
-              <a:t>12/11/2020</a:t>
+              <a:t>12/11/20</a:t>
             </a:fld>
             <a:endParaRPr lang="en-US" dirty="0"/>
           </a:p>
@@ -2324,7 +2531,7 @@
           <a:p>
             <a:fld id="{64F0E216-BA48-4F04-AC4F-645AA0DD6AC6}" type="datetimeFigureOut">
               <a:rPr lang="en-US" smtClean="0"/>
-              <a:t>12/11/2020</a:t>
+              <a:t>12/11/20</a:t>
             </a:fld>
             <a:endParaRPr lang="en-US"/>
           </a:p>
@@ -2560,7 +2767,7 @@
           <a:p>
             <a:fld id="{64F0E216-BA48-4F04-AC4F-645AA0DD6AC6}" type="datetimeFigureOut">
               <a:rPr lang="en-US" smtClean="0"/>
-              <a:t>12/11/2020</a:t>
+              <a:t>12/11/20</a:t>
             </a:fld>
             <a:endParaRPr lang="en-US"/>
           </a:p>
@@ -2783,7 +2990,7 @@
           <a:p>
             <a:fld id="{64F0E216-BA48-4F04-AC4F-645AA0DD6AC6}" type="datetimeFigureOut">
               <a:rPr lang="en-US" smtClean="0"/>
-              <a:t>12/11/2020</a:t>
+              <a:t>12/11/20</a:t>
             </a:fld>
             <a:endParaRPr lang="en-US"/>
           </a:p>
@@ -3085,7 +3292,7 @@
           <a:p>
             <a:fld id="{64F0E216-BA48-4F04-AC4F-645AA0DD6AC6}" type="datetimeFigureOut">
               <a:rPr lang="en-US" smtClean="0"/>
-              <a:t>12/11/2020</a:t>
+              <a:t>12/11/20</a:t>
             </a:fld>
             <a:endParaRPr lang="en-US"/>
           </a:p>
@@ -4549,7 +4756,7 @@
           <a:p>
             <a:fld id="{64F0E216-BA48-4F04-AC4F-645AA0DD6AC6}" type="datetimeFigureOut">
               <a:rPr lang="en-US" smtClean="0"/>
-              <a:t>12/11/2020</a:t>
+              <a:t>12/11/20</a:t>
             </a:fld>
             <a:endParaRPr lang="en-US"/>
           </a:p>
@@ -5016,7 +5223,7 @@
           <a:p>
             <a:fld id="{64F0E216-BA48-4F04-AC4F-645AA0DD6AC6}" type="datetimeFigureOut">
               <a:rPr lang="en-US" smtClean="0"/>
-              <a:t>12/11/2020</a:t>
+              <a:t>12/11/20</a:t>
             </a:fld>
             <a:endParaRPr lang="en-US"/>
           </a:p>
@@ -5191,7 +5398,7 @@
           <a:p>
             <a:fld id="{64F0E216-BA48-4F04-AC4F-645AA0DD6AC6}" type="datetimeFigureOut">
               <a:rPr lang="en-US" smtClean="0"/>
-              <a:t>12/11/2020</a:t>
+              <a:t>12/11/20</a:t>
             </a:fld>
             <a:endParaRPr lang="en-US"/>
           </a:p>
@@ -5328,7 +5535,7 @@
           <a:p>
             <a:fld id="{64F0E216-BA48-4F04-AC4F-645AA0DD6AC6}" type="datetimeFigureOut">
               <a:rPr lang="en-US" smtClean="0"/>
-              <a:t>12/11/2020</a:t>
+              <a:t>12/11/20</a:t>
             </a:fld>
             <a:endParaRPr lang="en-US"/>
           </a:p>
@@ -5678,7 +5885,7 @@
           <a:p>
             <a:fld id="{64F0E216-BA48-4F04-AC4F-645AA0DD6AC6}" type="datetimeFigureOut">
               <a:rPr lang="en-US" smtClean="0"/>
-              <a:t>12/11/2020</a:t>
+              <a:t>12/11/20</a:t>
             </a:fld>
             <a:endParaRPr lang="en-US"/>
           </a:p>
@@ -5999,7 +6206,7 @@
           <a:p>
             <a:fld id="{64F0E216-BA48-4F04-AC4F-645AA0DD6AC6}" type="datetimeFigureOut">
               <a:rPr lang="en-US" smtClean="0"/>
-              <a:t>12/11/2020</a:t>
+              <a:t>12/11/20</a:t>
             </a:fld>
             <a:endParaRPr lang="en-US"/>
           </a:p>
@@ -6261,7 +6468,7 @@
             <a:fld id="{64F0E216-BA48-4F04-AC4F-645AA0DD6AC6}" type="datetimeFigureOut">
               <a:rPr lang="en-US" smtClean="0"/>
               <a:pPr/>
-              <a:t>12/11/2020</a:t>
+              <a:t>12/11/20</a:t>
             </a:fld>
             <a:endParaRPr lang="en-US" dirty="0"/>
           </a:p>
@@ -7324,7 +7531,11 @@
           <a:p>
             <a:r>
               <a:rPr lang="fr-BE" dirty="0"/>
-              <a:t>GRAPH : Suicide BY Smoking</a:t>
+              <a:t>GRAPH : Suicide BY </a:t>
+            </a:r>
+            <a:r>
+              <a:rPr lang="fr-BE" dirty="0" err="1"/>
+              <a:t>Unemployment</a:t>
             </a:r>
             <a:endParaRPr lang="en-CH" dirty="0"/>
           </a:p>
@@ -7332,10 +7543,10 @@
       </p:sp>
       <p:pic>
         <p:nvPicPr>
-          <p:cNvPr id="5" name="Graphic 4">
-            <a:extLst>
-              <a:ext uri="{FF2B5EF4-FFF2-40B4-BE49-F238E27FC236}">
-                <a16:creationId xmlns:a16="http://schemas.microsoft.com/office/drawing/2014/main" id="{45C1EB94-6F06-6A4B-A167-8B153ED90168}"/>
+          <p:cNvPr id="6" name="Graphique 4" descr="Masculin avec un remplissage uni">
+            <a:extLst>
+              <a:ext uri="{FF2B5EF4-FFF2-40B4-BE49-F238E27FC236}">
+                <a16:creationId xmlns:a16="http://schemas.microsoft.com/office/drawing/2014/main" id="{4A3D1017-638D-6C4D-83BE-9982E5B9A284}"/>
               </a:ext>
             </a:extLst>
           </p:cNvPr>
@@ -7349,42 +7560,6 @@
             <a:extLst>
               <a:ext uri="{96DAC541-7B7A-43D3-8B79-37D633B846F1}">
                 <asvg:svgBlip xmlns:asvg="http://schemas.microsoft.com/office/drawing/2016/SVG/main" r:embed="rId4"/>
-              </a:ext>
-            </a:extLst>
-          </a:blip>
-          <a:stretch>
-            <a:fillRect/>
-          </a:stretch>
-        </p:blipFill>
-        <p:spPr>
-          <a:xfrm>
-            <a:off x="783656" y="2240663"/>
-            <a:ext cx="4808133" cy="3606099"/>
-          </a:xfrm>
-          <a:prstGeom prst="rect">
-            <a:avLst/>
-          </a:prstGeom>
-        </p:spPr>
-      </p:pic>
-      <p:pic>
-        <p:nvPicPr>
-          <p:cNvPr id="6" name="Graphique 4" descr="Masculin avec un remplissage uni">
-            <a:extLst>
-              <a:ext uri="{FF2B5EF4-FFF2-40B4-BE49-F238E27FC236}">
-                <a16:creationId xmlns:a16="http://schemas.microsoft.com/office/drawing/2014/main" id="{4A3D1017-638D-6C4D-83BE-9982E5B9A284}"/>
-              </a:ext>
-            </a:extLst>
-          </p:cNvPr>
-          <p:cNvPicPr>
-            <a:picLocks noChangeAspect="1"/>
-          </p:cNvPicPr>
-          <p:nvPr/>
-        </p:nvPicPr>
-        <p:blipFill>
-          <a:blip r:embed="rId5">
-            <a:extLst>
-              <a:ext uri="{96DAC541-7B7A-43D3-8B79-37D633B846F1}">
-                <asvg:svgBlip xmlns:asvg="http://schemas.microsoft.com/office/drawing/2016/SVG/main" r:embed="rId6"/>
               </a:ext>
             </a:extLst>
           </a:blip>
@@ -7417,7 +7592,7 @@
           <p:nvPr/>
         </p:nvPicPr>
         <p:blipFill>
-          <a:blip r:embed="rId7">
+          <a:blip r:embed="rId5">
             <a:lum bright="70000" contrast="-70000"/>
           </a:blip>
           <a:stretch>
@@ -7436,10 +7611,46 @@
       </p:pic>
       <p:pic>
         <p:nvPicPr>
-          <p:cNvPr id="8" name="Graphic 7">
-            <a:extLst>
-              <a:ext uri="{FF2B5EF4-FFF2-40B4-BE49-F238E27FC236}">
-                <a16:creationId xmlns:a16="http://schemas.microsoft.com/office/drawing/2014/main" id="{832F28AD-1052-F84F-B277-7D9FC6616F93}"/>
+          <p:cNvPr id="4" name="Graphic 3">
+            <a:extLst>
+              <a:ext uri="{FF2B5EF4-FFF2-40B4-BE49-F238E27FC236}">
+                <a16:creationId xmlns:a16="http://schemas.microsoft.com/office/drawing/2014/main" id="{F02992A0-5B7E-3546-ABD7-49B03CDE3DA8}"/>
+              </a:ext>
+            </a:extLst>
+          </p:cNvPr>
+          <p:cNvPicPr>
+            <a:picLocks noChangeAspect="1"/>
+          </p:cNvPicPr>
+          <p:nvPr/>
+        </p:nvPicPr>
+        <p:blipFill>
+          <a:blip r:embed="rId6">
+            <a:extLst>
+              <a:ext uri="{96DAC541-7B7A-43D3-8B79-37D633B846F1}">
+                <asvg:svgBlip xmlns:asvg="http://schemas.microsoft.com/office/drawing/2016/SVG/main" r:embed="rId7"/>
+              </a:ext>
+            </a:extLst>
+          </a:blip>
+          <a:stretch>
+            <a:fillRect/>
+          </a:stretch>
+        </p:blipFill>
+        <p:spPr>
+          <a:xfrm>
+            <a:off x="759783" y="2270199"/>
+            <a:ext cx="4808133" cy="3606100"/>
+          </a:xfrm>
+          <a:prstGeom prst="rect">
+            <a:avLst/>
+          </a:prstGeom>
+        </p:spPr>
+      </p:pic>
+      <p:pic>
+        <p:nvPicPr>
+          <p:cNvPr id="10" name="Graphic 9">
+            <a:extLst>
+              <a:ext uri="{FF2B5EF4-FFF2-40B4-BE49-F238E27FC236}">
+                <a16:creationId xmlns:a16="http://schemas.microsoft.com/office/drawing/2014/main" id="{6E6A2AE2-F1E3-EF4F-8A12-BA040F63A0F4}"/>
               </a:ext>
             </a:extLst>
           </p:cNvPr>
@@ -7462,8 +7673,8 @@
         </p:blipFill>
         <p:spPr>
           <a:xfrm>
-            <a:off x="6481479" y="2228620"/>
-            <a:ext cx="4808133" cy="3606100"/>
+            <a:off x="6449231" y="2228617"/>
+            <a:ext cx="4808135" cy="3606101"/>
           </a:xfrm>
           <a:prstGeom prst="rect">
             <a:avLst/>
@@ -7473,7 +7684,7 @@
     </p:spTree>
     <p:extLst>
       <p:ext uri="{BB962C8B-B14F-4D97-AF65-F5344CB8AC3E}">
-        <p14:creationId xmlns:p14="http://schemas.microsoft.com/office/powerpoint/2010/main" val="410148669"/>
+        <p14:creationId xmlns:p14="http://schemas.microsoft.com/office/powerpoint/2010/main" val="866707920"/>
       </p:ext>
     </p:extLst>
   </p:cSld>
@@ -7502,10 +7713,10 @@
       </p:grpSpPr>
       <p:sp>
         <p:nvSpPr>
-          <p:cNvPr id="2" name="Title 1">
-            <a:extLst>
-              <a:ext uri="{FF2B5EF4-FFF2-40B4-BE49-F238E27FC236}">
-                <a16:creationId xmlns:a16="http://schemas.microsoft.com/office/drawing/2014/main" id="{8EACBC7C-1508-DE47-9E7A-4F0D2693770C}"/>
+          <p:cNvPr id="26" name="Title 1">
+            <a:extLst>
+              <a:ext uri="{FF2B5EF4-FFF2-40B4-BE49-F238E27FC236}">
+                <a16:creationId xmlns:a16="http://schemas.microsoft.com/office/drawing/2014/main" id="{46BC7AA3-A385-4696-B6D1-CE09854B2CF0}"/>
               </a:ext>
             </a:extLst>
           </p:cNvPr>
@@ -7516,7 +7727,12 @@
             <p:ph type="title"/>
           </p:nvPr>
         </p:nvSpPr>
-        <p:spPr/>
+        <p:spPr>
+          <a:xfrm>
+            <a:off x="294572" y="186440"/>
+            <a:ext cx="10330269" cy="655637"/>
+          </a:xfrm>
+        </p:spPr>
         <p:txBody>
           <a:bodyPr>
             <a:normAutofit/>
@@ -7525,11 +7741,7 @@
           <a:p>
             <a:r>
               <a:rPr lang="fr-BE" dirty="0"/>
-              <a:t>GRAPH : Suicide BY </a:t>
-            </a:r>
-            <a:r>
-              <a:rPr lang="fr-BE" dirty="0" err="1"/>
-              <a:t>Unemployment</a:t>
+              <a:t>GRAPH : Suicide BY ALCOHOL CONSUMPTION</a:t>
             </a:r>
             <a:endParaRPr lang="en-CH" dirty="0"/>
           </a:p>
@@ -7537,10 +7749,10 @@
       </p:sp>
       <p:pic>
         <p:nvPicPr>
-          <p:cNvPr id="6" name="Graphique 4" descr="Masculin avec un remplissage uni">
-            <a:extLst>
-              <a:ext uri="{FF2B5EF4-FFF2-40B4-BE49-F238E27FC236}">
-                <a16:creationId xmlns:a16="http://schemas.microsoft.com/office/drawing/2014/main" id="{4A3D1017-638D-6C4D-83BE-9982E5B9A284}"/>
+          <p:cNvPr id="4" name="Graphique 4" descr="Masculin avec un remplissage uni">
+            <a:extLst>
+              <a:ext uri="{FF2B5EF4-FFF2-40B4-BE49-F238E27FC236}">
+                <a16:creationId xmlns:a16="http://schemas.microsoft.com/office/drawing/2014/main" id="{546B9EF8-B29E-5E46-802A-D1C20268DC9E}"/>
               </a:ext>
             </a:extLst>
           </p:cNvPr>
@@ -7573,10 +7785,10 @@
       </p:pic>
       <p:pic>
         <p:nvPicPr>
-          <p:cNvPr id="7" name="Image 6">
-            <a:extLst>
-              <a:ext uri="{FF2B5EF4-FFF2-40B4-BE49-F238E27FC236}">
-                <a16:creationId xmlns:a16="http://schemas.microsoft.com/office/drawing/2014/main" id="{F6F2E704-04D9-2644-BE9F-06977A9B5B88}"/>
+          <p:cNvPr id="5" name="Image 6">
+            <a:extLst>
+              <a:ext uri="{FF2B5EF4-FFF2-40B4-BE49-F238E27FC236}">
+                <a16:creationId xmlns:a16="http://schemas.microsoft.com/office/drawing/2014/main" id="{F1BC35B4-DA4B-D842-AFCD-F480EED24D61}"/>
               </a:ext>
             </a:extLst>
           </p:cNvPr>
@@ -7605,10 +7817,10 @@
       </p:pic>
       <p:pic>
         <p:nvPicPr>
-          <p:cNvPr id="4" name="Graphic 3">
-            <a:extLst>
-              <a:ext uri="{FF2B5EF4-FFF2-40B4-BE49-F238E27FC236}">
-                <a16:creationId xmlns:a16="http://schemas.microsoft.com/office/drawing/2014/main" id="{F02992A0-5B7E-3546-ABD7-49B03CDE3DA8}"/>
+          <p:cNvPr id="10" name="Graphic 9">
+            <a:extLst>
+              <a:ext uri="{FF2B5EF4-FFF2-40B4-BE49-F238E27FC236}">
+                <a16:creationId xmlns:a16="http://schemas.microsoft.com/office/drawing/2014/main" id="{A00C5D16-95A8-D843-AA2E-5BDB4CFB0C55}"/>
               </a:ext>
             </a:extLst>
           </p:cNvPr>
@@ -7631,8 +7843,8 @@
         </p:blipFill>
         <p:spPr>
           <a:xfrm>
-            <a:off x="759783" y="2270199"/>
-            <a:ext cx="4808133" cy="3606100"/>
+            <a:off x="6245525" y="1846052"/>
+            <a:ext cx="4981120" cy="3735840"/>
           </a:xfrm>
           <a:prstGeom prst="rect">
             <a:avLst/>
@@ -7641,10 +7853,10 @@
       </p:pic>
       <p:pic>
         <p:nvPicPr>
-          <p:cNvPr id="10" name="Graphic 9">
-            <a:extLst>
-              <a:ext uri="{FF2B5EF4-FFF2-40B4-BE49-F238E27FC236}">
-                <a16:creationId xmlns:a16="http://schemas.microsoft.com/office/drawing/2014/main" id="{6E6A2AE2-F1E3-EF4F-8A12-BA040F63A0F4}"/>
+          <p:cNvPr id="3" name="Graphic 2">
+            <a:extLst>
+              <a:ext uri="{FF2B5EF4-FFF2-40B4-BE49-F238E27FC236}">
+                <a16:creationId xmlns:a16="http://schemas.microsoft.com/office/drawing/2014/main" id="{282910C1-8698-8444-99A4-517451E2B95A}"/>
               </a:ext>
             </a:extLst>
           </p:cNvPr>
@@ -7667,8 +7879,8 @@
         </p:blipFill>
         <p:spPr>
           <a:xfrm>
-            <a:off x="6449231" y="2228617"/>
-            <a:ext cx="4808135" cy="3606101"/>
+            <a:off x="996462" y="1846052"/>
+            <a:ext cx="4981120" cy="3735840"/>
           </a:xfrm>
           <a:prstGeom prst="rect">
             <a:avLst/>
@@ -7678,7 +7890,7 @@
     </p:spTree>
     <p:extLst>
       <p:ext uri="{BB962C8B-B14F-4D97-AF65-F5344CB8AC3E}">
-        <p14:creationId xmlns:p14="http://schemas.microsoft.com/office/powerpoint/2010/main" val="866707920"/>
+        <p14:creationId xmlns:p14="http://schemas.microsoft.com/office/powerpoint/2010/main" val="2458617161"/>
       </p:ext>
     </p:extLst>
   </p:cSld>
@@ -7707,501 +7919,6 @@
       </p:grpSpPr>
       <p:sp>
         <p:nvSpPr>
-          <p:cNvPr id="26" name="Title 1">
-            <a:extLst>
-              <a:ext uri="{FF2B5EF4-FFF2-40B4-BE49-F238E27FC236}">
-                <a16:creationId xmlns:a16="http://schemas.microsoft.com/office/drawing/2014/main" id="{46BC7AA3-A385-4696-B6D1-CE09854B2CF0}"/>
-              </a:ext>
-            </a:extLst>
-          </p:cNvPr>
-          <p:cNvSpPr>
-            <a:spLocks noGrp="1"/>
-          </p:cNvSpPr>
-          <p:nvPr>
-            <p:ph type="title"/>
-          </p:nvPr>
-        </p:nvSpPr>
-        <p:spPr>
-          <a:xfrm>
-            <a:off x="294572" y="186440"/>
-            <a:ext cx="10330269" cy="655637"/>
-          </a:xfrm>
-        </p:spPr>
-        <p:txBody>
-          <a:bodyPr>
-            <a:normAutofit/>
-          </a:bodyPr>
-          <a:lstStyle/>
-          <a:p>
-            <a:r>
-              <a:rPr lang="fr-BE" dirty="0"/>
-              <a:t>GRAPH : Suicide BY ALCOHOL CONSUMPTION</a:t>
-            </a:r>
-            <a:endParaRPr lang="en-CH" dirty="0"/>
-          </a:p>
-        </p:txBody>
-      </p:sp>
-      <p:pic>
-        <p:nvPicPr>
-          <p:cNvPr id="4" name="Graphique 4" descr="Masculin avec un remplissage uni">
-            <a:extLst>
-              <a:ext uri="{FF2B5EF4-FFF2-40B4-BE49-F238E27FC236}">
-                <a16:creationId xmlns:a16="http://schemas.microsoft.com/office/drawing/2014/main" id="{546B9EF8-B29E-5E46-802A-D1C20268DC9E}"/>
-              </a:ext>
-            </a:extLst>
-          </p:cNvPr>
-          <p:cNvPicPr>
-            <a:picLocks noChangeAspect="1"/>
-          </p:cNvPicPr>
-          <p:nvPr/>
-        </p:nvPicPr>
-        <p:blipFill>
-          <a:blip r:embed="rId2">
-            <a:extLst>
-              <a:ext uri="{96DAC541-7B7A-43D3-8B79-37D633B846F1}">
-                <asvg:svgBlip xmlns:asvg="http://schemas.microsoft.com/office/drawing/2016/SVG/main" r:embed="rId3"/>
-              </a:ext>
-            </a:extLst>
-          </a:blip>
-          <a:stretch>
-            <a:fillRect/>
-          </a:stretch>
-        </p:blipFill>
-        <p:spPr>
-          <a:xfrm>
-            <a:off x="-59367" y="3315662"/>
-            <a:ext cx="914400" cy="914400"/>
-          </a:xfrm>
-          <a:prstGeom prst="rect">
-            <a:avLst/>
-          </a:prstGeom>
-        </p:spPr>
-      </p:pic>
-      <p:pic>
-        <p:nvPicPr>
-          <p:cNvPr id="5" name="Image 6">
-            <a:extLst>
-              <a:ext uri="{FF2B5EF4-FFF2-40B4-BE49-F238E27FC236}">
-                <a16:creationId xmlns:a16="http://schemas.microsoft.com/office/drawing/2014/main" id="{F1BC35B4-DA4B-D842-AFCD-F480EED24D61}"/>
-              </a:ext>
-            </a:extLst>
-          </p:cNvPr>
-          <p:cNvPicPr>
-            <a:picLocks noChangeAspect="1"/>
-          </p:cNvPicPr>
-          <p:nvPr/>
-        </p:nvPicPr>
-        <p:blipFill>
-          <a:blip r:embed="rId4">
-            <a:lum bright="70000" contrast="-70000"/>
-          </a:blip>
-          <a:stretch>
-            <a:fillRect/>
-          </a:stretch>
-        </p:blipFill>
-        <p:spPr>
-          <a:xfrm>
-            <a:off x="11372007" y="3315223"/>
-            <a:ext cx="819993" cy="819993"/>
-          </a:xfrm>
-          <a:prstGeom prst="rect">
-            <a:avLst/>
-          </a:prstGeom>
-        </p:spPr>
-      </p:pic>
-      <p:pic>
-        <p:nvPicPr>
-          <p:cNvPr id="10" name="Graphic 9">
-            <a:extLst>
-              <a:ext uri="{FF2B5EF4-FFF2-40B4-BE49-F238E27FC236}">
-                <a16:creationId xmlns:a16="http://schemas.microsoft.com/office/drawing/2014/main" id="{A00C5D16-95A8-D843-AA2E-5BDB4CFB0C55}"/>
-              </a:ext>
-            </a:extLst>
-          </p:cNvPr>
-          <p:cNvPicPr>
-            <a:picLocks noChangeAspect="1"/>
-          </p:cNvPicPr>
-          <p:nvPr/>
-        </p:nvPicPr>
-        <p:blipFill>
-          <a:blip r:embed="rId5">
-            <a:extLst>
-              <a:ext uri="{96DAC541-7B7A-43D3-8B79-37D633B846F1}">
-                <asvg:svgBlip xmlns:asvg="http://schemas.microsoft.com/office/drawing/2016/SVG/main" r:embed="rId6"/>
-              </a:ext>
-            </a:extLst>
-          </a:blip>
-          <a:stretch>
-            <a:fillRect/>
-          </a:stretch>
-        </p:blipFill>
-        <p:spPr>
-          <a:xfrm>
-            <a:off x="5658339" y="1696412"/>
-            <a:ext cx="5537200" cy="4152900"/>
-          </a:xfrm>
-          <a:prstGeom prst="rect">
-            <a:avLst/>
-          </a:prstGeom>
-        </p:spPr>
-      </p:pic>
-    </p:spTree>
-    <p:extLst>
-      <p:ext uri="{BB962C8B-B14F-4D97-AF65-F5344CB8AC3E}">
-        <p14:creationId xmlns:p14="http://schemas.microsoft.com/office/powerpoint/2010/main" val="2458617161"/>
-      </p:ext>
-    </p:extLst>
-  </p:cSld>
-  <p:clrMapOvr>
-    <a:masterClrMapping/>
-  </p:clrMapOvr>
-</p:sld>
-</file>
-
-<file path=ppt/slides/slide13.xml><?xml version="1.0" encoding="utf-8"?>
-<p:sld xmlns:a="http://schemas.openxmlformats.org/drawingml/2006/main" xmlns:r="http://schemas.openxmlformats.org/officeDocument/2006/relationships" xmlns:p="http://schemas.openxmlformats.org/presentationml/2006/main" show="0">
-  <p:cSld>
-    <p:spTree>
-      <p:nvGrpSpPr>
-        <p:cNvPr id="1" name=""/>
-        <p:cNvGrpSpPr/>
-        <p:nvPr/>
-      </p:nvGrpSpPr>
-      <p:grpSpPr>
-        <a:xfrm>
-          <a:off x="0" y="0"/>
-          <a:ext cx="0" cy="0"/>
-          <a:chOff x="0" y="0"/>
-          <a:chExt cx="0" cy="0"/>
-        </a:xfrm>
-      </p:grpSpPr>
-      <p:sp>
-        <p:nvSpPr>
-          <p:cNvPr id="2" name="Title 1">
-            <a:extLst>
-              <a:ext uri="{FF2B5EF4-FFF2-40B4-BE49-F238E27FC236}">
-                <a16:creationId xmlns:a16="http://schemas.microsoft.com/office/drawing/2014/main" id="{96C71840-5BC3-6B47-9BE7-C2B99EDB354F}"/>
-              </a:ext>
-            </a:extLst>
-          </p:cNvPr>
-          <p:cNvSpPr>
-            <a:spLocks noGrp="1"/>
-          </p:cNvSpPr>
-          <p:nvPr>
-            <p:ph type="title"/>
-          </p:nvPr>
-        </p:nvSpPr>
-        <p:spPr/>
-        <p:txBody>
-          <a:bodyPr/>
-          <a:lstStyle/>
-          <a:p>
-            <a:r>
-              <a:rPr lang="en-CH" dirty="0"/>
-              <a:t>Data Visualization – general fact</a:t>
-            </a:r>
-          </a:p>
-        </p:txBody>
-      </p:sp>
-      <p:sp>
-        <p:nvSpPr>
-          <p:cNvPr id="6" name="Espace réservé du contenu 5">
-            <a:extLst>
-              <a:ext uri="{FF2B5EF4-FFF2-40B4-BE49-F238E27FC236}">
-                <a16:creationId xmlns:a16="http://schemas.microsoft.com/office/drawing/2014/main" id="{5E7A9578-F3B8-44E3-96A2-2520FD09EACF}"/>
-              </a:ext>
-            </a:extLst>
-          </p:cNvPr>
-          <p:cNvSpPr>
-            <a:spLocks noGrp="1"/>
-          </p:cNvSpPr>
-          <p:nvPr>
-            <p:ph idx="1"/>
-          </p:nvPr>
-        </p:nvSpPr>
-        <p:spPr>
-          <a:xfrm>
-            <a:off x="843023" y="1666875"/>
-            <a:ext cx="10026650" cy="3978275"/>
-          </a:xfrm>
-        </p:spPr>
-        <p:txBody>
-          <a:bodyPr/>
-          <a:lstStyle/>
-          <a:p>
-            <a:r>
-              <a:rPr lang="en-GB" dirty="0"/>
-              <a:t>N</a:t>
-            </a:r>
-            <a:r>
-              <a:rPr lang="fr-BE" dirty="0"/>
-              <a:t>o significative </a:t>
-            </a:r>
-            <a:r>
-              <a:rPr lang="fr-BE" dirty="0" err="1"/>
-              <a:t>differences</a:t>
-            </a:r>
-            <a:r>
-              <a:rPr lang="fr-BE" dirty="0"/>
-              <a:t> in the </a:t>
-            </a:r>
-            <a:r>
-              <a:rPr lang="fr-BE" dirty="0" err="1"/>
-              <a:t>tendancy</a:t>
-            </a:r>
-            <a:r>
-              <a:rPr lang="fr-BE" dirty="0"/>
-              <a:t> </a:t>
-            </a:r>
-            <a:r>
-              <a:rPr lang="fr-BE" dirty="0" err="1"/>
-              <a:t>between</a:t>
-            </a:r>
-            <a:r>
-              <a:rPr lang="fr-BE" dirty="0"/>
-              <a:t> man and </a:t>
-            </a:r>
-            <a:r>
-              <a:rPr lang="fr-BE" dirty="0" err="1"/>
-              <a:t>women</a:t>
-            </a:r>
-            <a:r>
-              <a:rPr lang="fr-BE" dirty="0"/>
-              <a:t> in the relation </a:t>
-            </a:r>
-            <a:r>
-              <a:rPr lang="fr-BE" dirty="0" err="1"/>
-              <a:t>between</a:t>
-            </a:r>
-            <a:r>
-              <a:rPr lang="fr-BE" dirty="0"/>
-              <a:t> </a:t>
-            </a:r>
-            <a:r>
-              <a:rPr lang="fr-BE" dirty="0" err="1"/>
-              <a:t>alcohol</a:t>
-            </a:r>
-            <a:r>
-              <a:rPr lang="fr-BE" dirty="0"/>
-              <a:t> </a:t>
-            </a:r>
-            <a:r>
-              <a:rPr lang="fr-BE" dirty="0" err="1"/>
-              <a:t>consumption</a:t>
-            </a:r>
-            <a:r>
-              <a:rPr lang="fr-BE" dirty="0"/>
-              <a:t> or smoking </a:t>
-            </a:r>
-            <a:r>
-              <a:rPr lang="fr-BE" dirty="0" err="1"/>
-              <a:t>habbits</a:t>
-            </a:r>
-            <a:r>
-              <a:rPr lang="fr-BE" dirty="0"/>
-              <a:t> and suicides</a:t>
-            </a:r>
-          </a:p>
-          <a:p>
-            <a:r>
-              <a:rPr lang="fr-BE" dirty="0"/>
-              <a:t>Exemple </a:t>
-            </a:r>
-            <a:r>
-              <a:rPr lang="fr-BE" dirty="0" err="1"/>
-              <a:t>with</a:t>
-            </a:r>
-            <a:r>
-              <a:rPr lang="fr-BE" dirty="0"/>
-              <a:t> smoking </a:t>
-            </a:r>
-            <a:r>
-              <a:rPr lang="fr-BE" dirty="0" err="1"/>
-              <a:t>habbits</a:t>
-            </a:r>
-            <a:r>
-              <a:rPr lang="fr-BE" dirty="0"/>
-              <a:t> </a:t>
-            </a:r>
-            <a:endParaRPr lang="en-CH" dirty="0"/>
-          </a:p>
-          <a:p>
-            <a:endParaRPr lang="fr-BE" dirty="0"/>
-          </a:p>
-        </p:txBody>
-      </p:sp>
-      <p:pic>
-        <p:nvPicPr>
-          <p:cNvPr id="4" name="Graphic 3">
-            <a:extLst>
-              <a:ext uri="{FF2B5EF4-FFF2-40B4-BE49-F238E27FC236}">
-                <a16:creationId xmlns:a16="http://schemas.microsoft.com/office/drawing/2014/main" id="{35674C78-CEFB-4BB7-B1EC-E9305DD35E2E}"/>
-              </a:ext>
-            </a:extLst>
-          </p:cNvPr>
-          <p:cNvPicPr>
-            <a:picLocks noChangeAspect="1"/>
-          </p:cNvPicPr>
-          <p:nvPr/>
-        </p:nvPicPr>
-        <p:blipFill>
-          <a:blip r:embed="rId2">
-            <a:extLst>
-              <a:ext uri="{96DAC541-7B7A-43D3-8B79-37D633B846F1}">
-                <asvg:svgBlip xmlns:asvg="http://schemas.microsoft.com/office/drawing/2016/SVG/main" r:embed="rId3"/>
-              </a:ext>
-            </a:extLst>
-          </a:blip>
-          <a:stretch>
-            <a:fillRect/>
-          </a:stretch>
-        </p:blipFill>
-        <p:spPr>
-          <a:xfrm>
-            <a:off x="843023" y="3115714"/>
-            <a:ext cx="4808133" cy="3606099"/>
-          </a:xfrm>
-          <a:prstGeom prst="rect">
-            <a:avLst/>
-          </a:prstGeom>
-        </p:spPr>
-      </p:pic>
-      <p:pic>
-        <p:nvPicPr>
-          <p:cNvPr id="7" name="Graphique 4" descr="Masculin avec un remplissage uni">
-            <a:extLst>
-              <a:ext uri="{FF2B5EF4-FFF2-40B4-BE49-F238E27FC236}">
-                <a16:creationId xmlns:a16="http://schemas.microsoft.com/office/drawing/2014/main" id="{244FE8BC-EADB-4052-A394-68CBA730A0D7}"/>
-              </a:ext>
-            </a:extLst>
-          </p:cNvPr>
-          <p:cNvPicPr>
-            <a:picLocks noChangeAspect="1"/>
-          </p:cNvPicPr>
-          <p:nvPr/>
-        </p:nvPicPr>
-        <p:blipFill>
-          <a:blip r:embed="rId4">
-            <a:extLst>
-              <a:ext uri="{96DAC541-7B7A-43D3-8B79-37D633B846F1}">
-                <asvg:svgBlip xmlns:asvg="http://schemas.microsoft.com/office/drawing/2016/SVG/main" r:embed="rId5"/>
-              </a:ext>
-            </a:extLst>
-          </a:blip>
-          <a:stretch>
-            <a:fillRect/>
-          </a:stretch>
-        </p:blipFill>
-        <p:spPr>
-          <a:xfrm>
-            <a:off x="0" y="4190713"/>
-            <a:ext cx="914400" cy="914400"/>
-          </a:xfrm>
-          <a:prstGeom prst="rect">
-            <a:avLst/>
-          </a:prstGeom>
-        </p:spPr>
-      </p:pic>
-      <p:pic>
-        <p:nvPicPr>
-          <p:cNvPr id="8" name="Image 6">
-            <a:extLst>
-              <a:ext uri="{FF2B5EF4-FFF2-40B4-BE49-F238E27FC236}">
-                <a16:creationId xmlns:a16="http://schemas.microsoft.com/office/drawing/2014/main" id="{265DB0E3-D2C9-4FBA-9157-E963BAF1CE6F}"/>
-              </a:ext>
-            </a:extLst>
-          </p:cNvPr>
-          <p:cNvPicPr>
-            <a:picLocks noChangeAspect="1"/>
-          </p:cNvPicPr>
-          <p:nvPr/>
-        </p:nvPicPr>
-        <p:blipFill>
-          <a:blip r:embed="rId6">
-            <a:lum bright="70000" contrast="-70000"/>
-          </a:blip>
-          <a:stretch>
-            <a:fillRect/>
-          </a:stretch>
-        </p:blipFill>
-        <p:spPr>
-          <a:xfrm>
-            <a:off x="11431374" y="4190274"/>
-            <a:ext cx="819993" cy="819993"/>
-          </a:xfrm>
-          <a:prstGeom prst="rect">
-            <a:avLst/>
-          </a:prstGeom>
-        </p:spPr>
-      </p:pic>
-      <p:pic>
-        <p:nvPicPr>
-          <p:cNvPr id="9" name="Graphic 8">
-            <a:extLst>
-              <a:ext uri="{FF2B5EF4-FFF2-40B4-BE49-F238E27FC236}">
-                <a16:creationId xmlns:a16="http://schemas.microsoft.com/office/drawing/2014/main" id="{32A849C7-8C29-4D1E-8BA1-36F5A8CA24C5}"/>
-              </a:ext>
-            </a:extLst>
-          </p:cNvPr>
-          <p:cNvPicPr>
-            <a:picLocks noChangeAspect="1"/>
-          </p:cNvPicPr>
-          <p:nvPr/>
-        </p:nvPicPr>
-        <p:blipFill>
-          <a:blip r:embed="rId7">
-            <a:extLst>
-              <a:ext uri="{96DAC541-7B7A-43D3-8B79-37D633B846F1}">
-                <asvg:svgBlip xmlns:asvg="http://schemas.microsoft.com/office/drawing/2016/SVG/main" r:embed="rId8"/>
-              </a:ext>
-            </a:extLst>
-          </a:blip>
-          <a:stretch>
-            <a:fillRect/>
-          </a:stretch>
-        </p:blipFill>
-        <p:spPr>
-          <a:xfrm>
-            <a:off x="6540846" y="3103671"/>
-            <a:ext cx="4808133" cy="3606100"/>
-          </a:xfrm>
-          <a:prstGeom prst="rect">
-            <a:avLst/>
-          </a:prstGeom>
-        </p:spPr>
-      </p:pic>
-    </p:spTree>
-    <p:extLst>
-      <p:ext uri="{BB962C8B-B14F-4D97-AF65-F5344CB8AC3E}">
-        <p14:creationId xmlns:p14="http://schemas.microsoft.com/office/powerpoint/2010/main" val="103008590"/>
-      </p:ext>
-    </p:extLst>
-  </p:cSld>
-  <p:clrMapOvr>
-    <a:masterClrMapping/>
-  </p:clrMapOvr>
-</p:sld>
-</file>
-
-<file path=ppt/slides/slide14.xml><?xml version="1.0" encoding="utf-8"?>
-<p:sld xmlns:a="http://schemas.openxmlformats.org/drawingml/2006/main" xmlns:r="http://schemas.openxmlformats.org/officeDocument/2006/relationships" xmlns:p="http://schemas.openxmlformats.org/presentationml/2006/main">
-  <p:cSld>
-    <p:spTree>
-      <p:nvGrpSpPr>
-        <p:cNvPr id="1" name=""/>
-        <p:cNvGrpSpPr/>
-        <p:nvPr/>
-      </p:nvGrpSpPr>
-      <p:grpSpPr>
-        <a:xfrm>
-          <a:off x="0" y="0"/>
-          <a:ext cx="0" cy="0"/>
-          <a:chOff x="0" y="0"/>
-          <a:chExt cx="0" cy="0"/>
-        </a:xfrm>
-      </p:grpSpPr>
-      <p:sp>
-        <p:nvSpPr>
           <p:cNvPr id="2" name="Title 1">
             <a:extLst>
               <a:ext uri="{FF2B5EF4-FFF2-40B4-BE49-F238E27FC236}">
@@ -8345,7 +8062,7 @@
 </p:sld>
 </file>
 
-<file path=ppt/slides/slide15.xml><?xml version="1.0" encoding="utf-8"?>
+<file path=ppt/slides/slide13.xml><?xml version="1.0" encoding="utf-8"?>
 <p:sld xmlns:a="http://schemas.openxmlformats.org/drawingml/2006/main" xmlns:r="http://schemas.openxmlformats.org/officeDocument/2006/relationships" xmlns:p="http://schemas.openxmlformats.org/presentationml/2006/main">
   <p:cSld>
     <p:spTree>
@@ -8378,24 +8095,1056 @@
             <p:ph type="title"/>
           </p:nvPr>
         </p:nvSpPr>
-        <p:spPr/>
+        <p:spPr>
+          <a:xfrm>
+            <a:off x="793630" y="655608"/>
+            <a:ext cx="10886536" cy="1011267"/>
+          </a:xfrm>
+        </p:spPr>
         <p:txBody>
-          <a:bodyPr/>
+          <a:bodyPr>
+            <a:normAutofit/>
+          </a:bodyPr>
           <a:lstStyle/>
           <a:p>
             <a:r>
               <a:rPr lang="en-CH" dirty="0"/>
-              <a:t>GRAph: Suicides for gdp per capita</a:t>
-            </a:r>
+              <a:t>GRAph: Suicides PEr gdp per capita</a:t>
+            </a:r>
+          </a:p>
+        </p:txBody>
+      </p:sp>
+      <p:pic>
+        <p:nvPicPr>
+          <p:cNvPr id="4" name="Content Placeholder 3">
+            <a:extLst>
+              <a:ext uri="{FF2B5EF4-FFF2-40B4-BE49-F238E27FC236}">
+                <a16:creationId xmlns:a16="http://schemas.microsoft.com/office/drawing/2014/main" id="{0295FF91-841B-064B-AD8C-1D4D0F60FCF6}"/>
+              </a:ext>
+            </a:extLst>
+          </p:cNvPr>
+          <p:cNvPicPr>
+            <a:picLocks noGrp="1" noChangeAspect="1"/>
+          </p:cNvPicPr>
+          <p:nvPr>
+            <p:ph idx="1"/>
+          </p:nvPr>
+        </p:nvPicPr>
+        <p:blipFill>
+          <a:blip r:embed="rId3">
+            <a:extLst>
+              <a:ext uri="{96DAC541-7B7A-43D3-8B79-37D633B846F1}">
+                <asvg:svgBlip xmlns:asvg="http://schemas.microsoft.com/office/drawing/2016/SVG/main" r:embed="rId4"/>
+              </a:ext>
+            </a:extLst>
+          </a:blip>
+          <a:stretch>
+            <a:fillRect/>
+          </a:stretch>
+        </p:blipFill>
+        <p:spPr>
+          <a:xfrm>
+            <a:off x="2380889" y="1666874"/>
+            <a:ext cx="6366296" cy="4774723"/>
+          </a:xfrm>
+        </p:spPr>
+      </p:pic>
+    </p:spTree>
+    <p:extLst>
+      <p:ext uri="{BB962C8B-B14F-4D97-AF65-F5344CB8AC3E}">
+        <p14:creationId xmlns:p14="http://schemas.microsoft.com/office/powerpoint/2010/main" val="1974929923"/>
+      </p:ext>
+    </p:extLst>
+  </p:cSld>
+  <p:clrMapOvr>
+    <a:masterClrMapping/>
+  </p:clrMapOvr>
+</p:sld>
+</file>
+
+<file path=ppt/slides/slide14.xml><?xml version="1.0" encoding="utf-8"?>
+<p:sld xmlns:a="http://schemas.openxmlformats.org/drawingml/2006/main" xmlns:r="http://schemas.openxmlformats.org/officeDocument/2006/relationships" xmlns:p="http://schemas.openxmlformats.org/presentationml/2006/main">
+  <p:cSld>
+    <p:bg>
+      <p:bgPr>
+        <a:solidFill>
+          <a:schemeClr val="bg2"/>
+        </a:solidFill>
+        <a:effectLst/>
+      </p:bgPr>
+    </p:bg>
+    <p:spTree>
+      <p:nvGrpSpPr>
+        <p:cNvPr id="1" name=""/>
+        <p:cNvGrpSpPr/>
+        <p:nvPr/>
+      </p:nvGrpSpPr>
+      <p:grpSpPr>
+        <a:xfrm>
+          <a:off x="0" y="0"/>
+          <a:ext cx="0" cy="0"/>
+          <a:chOff x="0" y="0"/>
+          <a:chExt cx="0" cy="0"/>
+        </a:xfrm>
+      </p:grpSpPr>
+      <p:cxnSp>
+        <p:nvCxnSpPr>
+          <p:cNvPr id="24" name="Straight Connector 23">
+            <a:extLst>
+              <a:ext uri="{FF2B5EF4-FFF2-40B4-BE49-F238E27FC236}">
+                <a16:creationId xmlns:a16="http://schemas.microsoft.com/office/drawing/2014/main" id="{701C0CAB-6A03-4C6A-9FAA-219847753628}"/>
+              </a:ext>
+              <a:ext uri="{C183D7F6-B498-43B3-948B-1728B52AA6E4}">
+                <adec:decorative xmlns:adec="http://schemas.microsoft.com/office/drawing/2017/decorative" val="1"/>
+              </a:ext>
+            </a:extLst>
+          </p:cNvPr>
+          <p:cNvCxnSpPr>
+            <a:cxnSpLocks noGrp="1" noRot="1" noChangeAspect="1" noMove="1" noResize="1" noEditPoints="1" noAdjustHandles="1" noChangeArrowheads="1" noChangeShapeType="1"/>
+          </p:cNvCxnSpPr>
+          <p:nvPr>
+            <p:extLst>
+              <p:ext uri="{386F3935-93C4-4BCD-93E2-E3B085C9AB24}">
+                <p16:designElem xmlns:p16="http://schemas.microsoft.com/office/powerpoint/2015/main" val="1"/>
+              </p:ext>
+            </p:extLst>
+          </p:nvPr>
+        </p:nvCxnSpPr>
+        <p:spPr>
+          <a:xfrm>
+            <a:off x="5826000" y="3690871"/>
+            <a:ext cx="540000" cy="0"/>
+          </a:xfrm>
+          <a:prstGeom prst="line">
+            <a:avLst/>
+          </a:prstGeom>
+          <a:ln w="12700">
+            <a:solidFill>
+              <a:schemeClr val="tx1"/>
+            </a:solidFill>
+          </a:ln>
+        </p:spPr>
+        <p:style>
+          <a:lnRef idx="1">
+            <a:schemeClr val="accent1"/>
+          </a:lnRef>
+          <a:fillRef idx="0">
+            <a:schemeClr val="accent1"/>
+          </a:fillRef>
+          <a:effectRef idx="0">
+            <a:schemeClr val="accent1"/>
+          </a:effectRef>
+          <a:fontRef idx="minor">
+            <a:schemeClr val="tx1"/>
+          </a:fontRef>
+        </p:style>
+      </p:cxnSp>
+      <p:grpSp>
+        <p:nvGrpSpPr>
+          <p:cNvPr id="26" name="Group 25">
+            <a:extLst>
+              <a:ext uri="{FF2B5EF4-FFF2-40B4-BE49-F238E27FC236}">
+                <a16:creationId xmlns:a16="http://schemas.microsoft.com/office/drawing/2014/main" id="{F982E0B2-AA9C-441C-A08E-A9DF9CF12116}"/>
+              </a:ext>
+              <a:ext uri="{C183D7F6-B498-43B3-948B-1728B52AA6E4}">
+                <adec:decorative xmlns:adec="http://schemas.microsoft.com/office/drawing/2017/decorative" val="1"/>
+              </a:ext>
+            </a:extLst>
+          </p:cNvPr>
+          <p:cNvGrpSpPr>
+            <a:grpSpLocks noGrp="1" noUngrp="1" noRot="1" noChangeAspect="1" noMove="1" noResize="1"/>
+          </p:cNvGrpSpPr>
+          <p:nvPr>
+            <p:extLst>
+              <p:ext uri="{386F3935-93C4-4BCD-93E2-E3B085C9AB24}">
+                <p16:designElem xmlns:p16="http://schemas.microsoft.com/office/powerpoint/2015/main" val="1"/>
+              </p:ext>
+            </p:extLst>
+          </p:nvPr>
+        </p:nvGrpSpPr>
+        <p:grpSpPr>
+          <a:xfrm>
+            <a:off x="9728046" y="4869342"/>
+            <a:ext cx="1623711" cy="630920"/>
+            <a:chOff x="9588346" y="4824892"/>
+            <a:chExt cx="1623711" cy="630920"/>
+          </a:xfrm>
+        </p:grpSpPr>
+        <p:sp>
+          <p:nvSpPr>
+            <p:cNvPr id="27" name="Freeform: Shape 26">
+              <a:extLst>
+                <a:ext uri="{FF2B5EF4-FFF2-40B4-BE49-F238E27FC236}">
+                  <a16:creationId xmlns:a16="http://schemas.microsoft.com/office/drawing/2014/main" id="{A4A2E074-C10D-4C57-AB72-B631E4D77102}"/>
+                </a:ext>
+                <a:ext uri="{C183D7F6-B498-43B3-948B-1728B52AA6E4}">
+                  <adec:decorative xmlns:adec="http://schemas.microsoft.com/office/drawing/2017/decorative" val="1"/>
+                </a:ext>
+              </a:extLst>
+            </p:cNvPr>
+            <p:cNvSpPr/>
+            <p:nvPr>
+              <p:extLst>
+                <p:ext uri="{386F3935-93C4-4BCD-93E2-E3B085C9AB24}">
+                  <p16:designElem xmlns:p16="http://schemas.microsoft.com/office/powerpoint/2015/main" val="1"/>
+                </p:ext>
+              </p:extLst>
+            </p:nvPr>
+          </p:nvSpPr>
+          <p:spPr>
+            <a:xfrm rot="2700000" flipH="1">
+              <a:off x="10267789" y="4452443"/>
+              <a:ext cx="571820" cy="1316717"/>
+            </a:xfrm>
+            <a:custGeom>
+              <a:avLst/>
+              <a:gdLst>
+                <a:gd name="connsiteX0" fmla="*/ 282417 w 571820"/>
+                <a:gd name="connsiteY0" fmla="*/ 0 h 1316717"/>
+                <a:gd name="connsiteX1" fmla="*/ 285910 w 571820"/>
+                <a:gd name="connsiteY1" fmla="*/ 3175 h 1316717"/>
+                <a:gd name="connsiteX2" fmla="*/ 287393 w 571820"/>
+                <a:gd name="connsiteY2" fmla="*/ 1827 h 1316717"/>
+                <a:gd name="connsiteX3" fmla="*/ 289403 w 571820"/>
+                <a:gd name="connsiteY3" fmla="*/ 0 h 1316717"/>
+                <a:gd name="connsiteX4" fmla="*/ 289403 w 571820"/>
+                <a:gd name="connsiteY4" fmla="*/ 6349 h 1316717"/>
+                <a:gd name="connsiteX5" fmla="*/ 309203 w 571820"/>
+                <a:gd name="connsiteY5" fmla="*/ 24345 h 1316717"/>
+                <a:gd name="connsiteX6" fmla="*/ 571820 w 571820"/>
+                <a:gd name="connsiteY6" fmla="*/ 658359 h 1316717"/>
+                <a:gd name="connsiteX7" fmla="*/ 309203 w 571820"/>
+                <a:gd name="connsiteY7" fmla="*/ 1292372 h 1316717"/>
+                <a:gd name="connsiteX8" fmla="*/ 289403 w 571820"/>
+                <a:gd name="connsiteY8" fmla="*/ 1310368 h 1316717"/>
+                <a:gd name="connsiteX9" fmla="*/ 289403 w 571820"/>
+                <a:gd name="connsiteY9" fmla="*/ 1316717 h 1316717"/>
+                <a:gd name="connsiteX10" fmla="*/ 287393 w 571820"/>
+                <a:gd name="connsiteY10" fmla="*/ 1314890 h 1316717"/>
+                <a:gd name="connsiteX11" fmla="*/ 285910 w 571820"/>
+                <a:gd name="connsiteY11" fmla="*/ 1313542 h 1316717"/>
+                <a:gd name="connsiteX12" fmla="*/ 282417 w 571820"/>
+                <a:gd name="connsiteY12" fmla="*/ 1316717 h 1316717"/>
+                <a:gd name="connsiteX13" fmla="*/ 282417 w 571820"/>
+                <a:gd name="connsiteY13" fmla="*/ 1310367 h 1316717"/>
+                <a:gd name="connsiteX14" fmla="*/ 262617 w 571820"/>
+                <a:gd name="connsiteY14" fmla="*/ 1292372 h 1316717"/>
+                <a:gd name="connsiteX15" fmla="*/ 0 w 571820"/>
+                <a:gd name="connsiteY15" fmla="*/ 658358 h 1316717"/>
+                <a:gd name="connsiteX16" fmla="*/ 262617 w 571820"/>
+                <a:gd name="connsiteY16" fmla="*/ 24345 h 1316717"/>
+                <a:gd name="connsiteX17" fmla="*/ 282417 w 571820"/>
+                <a:gd name="connsiteY17" fmla="*/ 6349 h 1316717"/>
+              </a:gdLst>
+              <a:ahLst/>
+              <a:cxnLst>
+                <a:cxn ang="0">
+                  <a:pos x="connsiteX0" y="connsiteY0"/>
+                </a:cxn>
+                <a:cxn ang="0">
+                  <a:pos x="connsiteX1" y="connsiteY1"/>
+                </a:cxn>
+                <a:cxn ang="0">
+                  <a:pos x="connsiteX2" y="connsiteY2"/>
+                </a:cxn>
+                <a:cxn ang="0">
+                  <a:pos x="connsiteX3" y="connsiteY3"/>
+                </a:cxn>
+                <a:cxn ang="0">
+                  <a:pos x="connsiteX4" y="connsiteY4"/>
+                </a:cxn>
+                <a:cxn ang="0">
+                  <a:pos x="connsiteX5" y="connsiteY5"/>
+                </a:cxn>
+                <a:cxn ang="0">
+                  <a:pos x="connsiteX6" y="connsiteY6"/>
+                </a:cxn>
+                <a:cxn ang="0">
+                  <a:pos x="connsiteX7" y="connsiteY7"/>
+                </a:cxn>
+                <a:cxn ang="0">
+                  <a:pos x="connsiteX8" y="connsiteY8"/>
+                </a:cxn>
+                <a:cxn ang="0">
+                  <a:pos x="connsiteX9" y="connsiteY9"/>
+                </a:cxn>
+                <a:cxn ang="0">
+                  <a:pos x="connsiteX10" y="connsiteY10"/>
+                </a:cxn>
+                <a:cxn ang="0">
+                  <a:pos x="connsiteX11" y="connsiteY11"/>
+                </a:cxn>
+                <a:cxn ang="0">
+                  <a:pos x="connsiteX12" y="connsiteY12"/>
+                </a:cxn>
+                <a:cxn ang="0">
+                  <a:pos x="connsiteX13" y="connsiteY13"/>
+                </a:cxn>
+                <a:cxn ang="0">
+                  <a:pos x="connsiteX14" y="connsiteY14"/>
+                </a:cxn>
+                <a:cxn ang="0">
+                  <a:pos x="connsiteX15" y="connsiteY15"/>
+                </a:cxn>
+                <a:cxn ang="0">
+                  <a:pos x="connsiteX16" y="connsiteY16"/>
+                </a:cxn>
+                <a:cxn ang="0">
+                  <a:pos x="connsiteX17" y="connsiteY17"/>
+                </a:cxn>
+              </a:cxnLst>
+              <a:rect l="l" t="t" r="r" b="b"/>
+              <a:pathLst>
+                <a:path w="571820" h="1316717">
+                  <a:moveTo>
+                    <a:pt x="282417" y="0"/>
+                  </a:moveTo>
+                  <a:lnTo>
+                    <a:pt x="285910" y="3175"/>
+                  </a:lnTo>
+                  <a:lnTo>
+                    <a:pt x="287393" y="1827"/>
+                  </a:lnTo>
+                  <a:lnTo>
+                    <a:pt x="289403" y="0"/>
+                  </a:lnTo>
+                  <a:lnTo>
+                    <a:pt x="289403" y="6349"/>
+                  </a:lnTo>
+                  <a:lnTo>
+                    <a:pt x="309203" y="24345"/>
+                  </a:lnTo>
+                  <a:cubicBezTo>
+                    <a:pt x="471461" y="186603"/>
+                    <a:pt x="571820" y="410761"/>
+                    <a:pt x="571820" y="658359"/>
+                  </a:cubicBezTo>
+                  <a:cubicBezTo>
+                    <a:pt x="571820" y="905956"/>
+                    <a:pt x="471461" y="1130114"/>
+                    <a:pt x="309203" y="1292372"/>
+                  </a:cubicBezTo>
+                  <a:lnTo>
+                    <a:pt x="289403" y="1310368"/>
+                  </a:lnTo>
+                  <a:lnTo>
+                    <a:pt x="289403" y="1316717"/>
+                  </a:lnTo>
+                  <a:lnTo>
+                    <a:pt x="287393" y="1314890"/>
+                  </a:lnTo>
+                  <a:lnTo>
+                    <a:pt x="285910" y="1313542"/>
+                  </a:lnTo>
+                  <a:lnTo>
+                    <a:pt x="282417" y="1316717"/>
+                  </a:lnTo>
+                  <a:lnTo>
+                    <a:pt x="282417" y="1310367"/>
+                  </a:lnTo>
+                  <a:lnTo>
+                    <a:pt x="262617" y="1292372"/>
+                  </a:lnTo>
+                  <a:cubicBezTo>
+                    <a:pt x="100359" y="1130113"/>
+                    <a:pt x="0" y="905956"/>
+                    <a:pt x="0" y="658358"/>
+                  </a:cubicBezTo>
+                  <a:cubicBezTo>
+                    <a:pt x="0" y="410761"/>
+                    <a:pt x="100359" y="186603"/>
+                    <a:pt x="262617" y="24345"/>
+                  </a:cubicBezTo>
+                  <a:lnTo>
+                    <a:pt x="282417" y="6349"/>
+                  </a:lnTo>
+                  <a:close/>
+                </a:path>
+              </a:pathLst>
+            </a:custGeom>
+            <a:solidFill>
+              <a:schemeClr val="accent4">
+                <a:alpha val="40000"/>
+              </a:schemeClr>
+            </a:solidFill>
+            <a:ln w="12700">
+              <a:noFill/>
+            </a:ln>
+          </p:spPr>
+          <p:style>
+            <a:lnRef idx="2">
+              <a:schemeClr val="accent1">
+                <a:shade val="50000"/>
+              </a:schemeClr>
+            </a:lnRef>
+            <a:fillRef idx="1">
+              <a:schemeClr val="accent1"/>
+            </a:fillRef>
+            <a:effectRef idx="0">
+              <a:schemeClr val="accent1"/>
+            </a:effectRef>
+            <a:fontRef idx="minor">
+              <a:schemeClr val="lt1"/>
+            </a:fontRef>
+          </p:style>
+          <p:txBody>
+            <a:bodyPr rtlCol="0" anchor="ctr"/>
+            <a:lstStyle/>
+            <a:p>
+              <a:pPr algn="ctr"/>
+              <a:endParaRPr lang="en-US"/>
+            </a:p>
+          </p:txBody>
+        </p:sp>
+        <p:grpSp>
+          <p:nvGrpSpPr>
+            <p:cNvPr id="28" name="Group 27">
+              <a:extLst>
+                <a:ext uri="{FF2B5EF4-FFF2-40B4-BE49-F238E27FC236}">
+                  <a16:creationId xmlns:a16="http://schemas.microsoft.com/office/drawing/2014/main" id="{0B037EB3-1772-4BA8-A95A-E5DBDFEA32B0}"/>
+                </a:ext>
+                <a:ext uri="{C183D7F6-B498-43B3-948B-1728B52AA6E4}">
+                  <adec:decorative xmlns:adec="http://schemas.microsoft.com/office/drawing/2017/decorative" val="1"/>
+                </a:ext>
+              </a:extLst>
+            </p:cNvPr>
+            <p:cNvGrpSpPr/>
+            <p:nvPr>
+              <p:extLst>
+                <p:ext uri="{386F3935-93C4-4BCD-93E2-E3B085C9AB24}">
+                  <p16:designElem xmlns:p16="http://schemas.microsoft.com/office/powerpoint/2015/main" val="1"/>
+                </p:ext>
+              </p:extLst>
+            </p:nvPr>
+          </p:nvGrpSpPr>
+          <p:grpSpPr>
+            <a:xfrm rot="2700000" flipH="1">
+              <a:off x="10112436" y="4359902"/>
+              <a:ext cx="571820" cy="1620000"/>
+              <a:chOff x="8482785" y="4330454"/>
+              <a:chExt cx="571820" cy="1620000"/>
+            </a:xfrm>
+          </p:grpSpPr>
+          <p:sp>
+            <p:nvSpPr>
+              <p:cNvPr id="29" name="Freeform: Shape 28">
+                <a:extLst>
+                  <a:ext uri="{FF2B5EF4-FFF2-40B4-BE49-F238E27FC236}">
+                    <a16:creationId xmlns:a16="http://schemas.microsoft.com/office/drawing/2014/main" id="{A1F47AC1-63D0-47F3-9728-1A0A0543494B}"/>
+                  </a:ext>
+                  <a:ext uri="{C183D7F6-B498-43B3-948B-1728B52AA6E4}">
+                    <adec:decorative xmlns:adec="http://schemas.microsoft.com/office/drawing/2017/decorative" val="1"/>
+                  </a:ext>
+                </a:extLst>
+              </p:cNvPr>
+              <p:cNvSpPr/>
+              <p:nvPr>
+                <p:extLst>
+                  <p:ext uri="{386F3935-93C4-4BCD-93E2-E3B085C9AB24}">
+                    <p16:designElem xmlns:p16="http://schemas.microsoft.com/office/powerpoint/2015/main" val="1"/>
+                  </p:ext>
+                </p:extLst>
+              </p:nvPr>
+            </p:nvSpPr>
+            <p:spPr>
+              <a:xfrm>
+                <a:off x="8482785" y="4333632"/>
+                <a:ext cx="571820" cy="1311956"/>
+              </a:xfrm>
+              <a:custGeom>
+                <a:avLst/>
+                <a:gdLst>
+                  <a:gd name="connsiteX0" fmla="*/ 282417 w 571820"/>
+                  <a:gd name="connsiteY0" fmla="*/ 0 h 1316717"/>
+                  <a:gd name="connsiteX1" fmla="*/ 285910 w 571820"/>
+                  <a:gd name="connsiteY1" fmla="*/ 3175 h 1316717"/>
+                  <a:gd name="connsiteX2" fmla="*/ 287393 w 571820"/>
+                  <a:gd name="connsiteY2" fmla="*/ 1827 h 1316717"/>
+                  <a:gd name="connsiteX3" fmla="*/ 289403 w 571820"/>
+                  <a:gd name="connsiteY3" fmla="*/ 0 h 1316717"/>
+                  <a:gd name="connsiteX4" fmla="*/ 289403 w 571820"/>
+                  <a:gd name="connsiteY4" fmla="*/ 6349 h 1316717"/>
+                  <a:gd name="connsiteX5" fmla="*/ 309203 w 571820"/>
+                  <a:gd name="connsiteY5" fmla="*/ 24345 h 1316717"/>
+                  <a:gd name="connsiteX6" fmla="*/ 571820 w 571820"/>
+                  <a:gd name="connsiteY6" fmla="*/ 658359 h 1316717"/>
+                  <a:gd name="connsiteX7" fmla="*/ 309203 w 571820"/>
+                  <a:gd name="connsiteY7" fmla="*/ 1292372 h 1316717"/>
+                  <a:gd name="connsiteX8" fmla="*/ 289403 w 571820"/>
+                  <a:gd name="connsiteY8" fmla="*/ 1310368 h 1316717"/>
+                  <a:gd name="connsiteX9" fmla="*/ 289403 w 571820"/>
+                  <a:gd name="connsiteY9" fmla="*/ 1316717 h 1316717"/>
+                  <a:gd name="connsiteX10" fmla="*/ 287393 w 571820"/>
+                  <a:gd name="connsiteY10" fmla="*/ 1314890 h 1316717"/>
+                  <a:gd name="connsiteX11" fmla="*/ 285910 w 571820"/>
+                  <a:gd name="connsiteY11" fmla="*/ 1313542 h 1316717"/>
+                  <a:gd name="connsiteX12" fmla="*/ 282417 w 571820"/>
+                  <a:gd name="connsiteY12" fmla="*/ 1316717 h 1316717"/>
+                  <a:gd name="connsiteX13" fmla="*/ 282417 w 571820"/>
+                  <a:gd name="connsiteY13" fmla="*/ 1310367 h 1316717"/>
+                  <a:gd name="connsiteX14" fmla="*/ 262617 w 571820"/>
+                  <a:gd name="connsiteY14" fmla="*/ 1292372 h 1316717"/>
+                  <a:gd name="connsiteX15" fmla="*/ 0 w 571820"/>
+                  <a:gd name="connsiteY15" fmla="*/ 658358 h 1316717"/>
+                  <a:gd name="connsiteX16" fmla="*/ 262617 w 571820"/>
+                  <a:gd name="connsiteY16" fmla="*/ 24345 h 1316717"/>
+                  <a:gd name="connsiteX17" fmla="*/ 282417 w 571820"/>
+                  <a:gd name="connsiteY17" fmla="*/ 6349 h 1316717"/>
+                  <a:gd name="connsiteX0" fmla="*/ 282417 w 571820"/>
+                  <a:gd name="connsiteY0" fmla="*/ 6349 h 1316717"/>
+                  <a:gd name="connsiteX1" fmla="*/ 285910 w 571820"/>
+                  <a:gd name="connsiteY1" fmla="*/ 3175 h 1316717"/>
+                  <a:gd name="connsiteX2" fmla="*/ 287393 w 571820"/>
+                  <a:gd name="connsiteY2" fmla="*/ 1827 h 1316717"/>
+                  <a:gd name="connsiteX3" fmla="*/ 289403 w 571820"/>
+                  <a:gd name="connsiteY3" fmla="*/ 0 h 1316717"/>
+                  <a:gd name="connsiteX4" fmla="*/ 289403 w 571820"/>
+                  <a:gd name="connsiteY4" fmla="*/ 6349 h 1316717"/>
+                  <a:gd name="connsiteX5" fmla="*/ 309203 w 571820"/>
+                  <a:gd name="connsiteY5" fmla="*/ 24345 h 1316717"/>
+                  <a:gd name="connsiteX6" fmla="*/ 571820 w 571820"/>
+                  <a:gd name="connsiteY6" fmla="*/ 658359 h 1316717"/>
+                  <a:gd name="connsiteX7" fmla="*/ 309203 w 571820"/>
+                  <a:gd name="connsiteY7" fmla="*/ 1292372 h 1316717"/>
+                  <a:gd name="connsiteX8" fmla="*/ 289403 w 571820"/>
+                  <a:gd name="connsiteY8" fmla="*/ 1310368 h 1316717"/>
+                  <a:gd name="connsiteX9" fmla="*/ 289403 w 571820"/>
+                  <a:gd name="connsiteY9" fmla="*/ 1316717 h 1316717"/>
+                  <a:gd name="connsiteX10" fmla="*/ 287393 w 571820"/>
+                  <a:gd name="connsiteY10" fmla="*/ 1314890 h 1316717"/>
+                  <a:gd name="connsiteX11" fmla="*/ 285910 w 571820"/>
+                  <a:gd name="connsiteY11" fmla="*/ 1313542 h 1316717"/>
+                  <a:gd name="connsiteX12" fmla="*/ 282417 w 571820"/>
+                  <a:gd name="connsiteY12" fmla="*/ 1316717 h 1316717"/>
+                  <a:gd name="connsiteX13" fmla="*/ 282417 w 571820"/>
+                  <a:gd name="connsiteY13" fmla="*/ 1310367 h 1316717"/>
+                  <a:gd name="connsiteX14" fmla="*/ 262617 w 571820"/>
+                  <a:gd name="connsiteY14" fmla="*/ 1292372 h 1316717"/>
+                  <a:gd name="connsiteX15" fmla="*/ 0 w 571820"/>
+                  <a:gd name="connsiteY15" fmla="*/ 658358 h 1316717"/>
+                  <a:gd name="connsiteX16" fmla="*/ 262617 w 571820"/>
+                  <a:gd name="connsiteY16" fmla="*/ 24345 h 1316717"/>
+                  <a:gd name="connsiteX17" fmla="*/ 282417 w 571820"/>
+                  <a:gd name="connsiteY17" fmla="*/ 6349 h 1316717"/>
+                  <a:gd name="connsiteX0" fmla="*/ 262617 w 571820"/>
+                  <a:gd name="connsiteY0" fmla="*/ 24345 h 1316717"/>
+                  <a:gd name="connsiteX1" fmla="*/ 285910 w 571820"/>
+                  <a:gd name="connsiteY1" fmla="*/ 3175 h 1316717"/>
+                  <a:gd name="connsiteX2" fmla="*/ 287393 w 571820"/>
+                  <a:gd name="connsiteY2" fmla="*/ 1827 h 1316717"/>
+                  <a:gd name="connsiteX3" fmla="*/ 289403 w 571820"/>
+                  <a:gd name="connsiteY3" fmla="*/ 0 h 1316717"/>
+                  <a:gd name="connsiteX4" fmla="*/ 289403 w 571820"/>
+                  <a:gd name="connsiteY4" fmla="*/ 6349 h 1316717"/>
+                  <a:gd name="connsiteX5" fmla="*/ 309203 w 571820"/>
+                  <a:gd name="connsiteY5" fmla="*/ 24345 h 1316717"/>
+                  <a:gd name="connsiteX6" fmla="*/ 571820 w 571820"/>
+                  <a:gd name="connsiteY6" fmla="*/ 658359 h 1316717"/>
+                  <a:gd name="connsiteX7" fmla="*/ 309203 w 571820"/>
+                  <a:gd name="connsiteY7" fmla="*/ 1292372 h 1316717"/>
+                  <a:gd name="connsiteX8" fmla="*/ 289403 w 571820"/>
+                  <a:gd name="connsiteY8" fmla="*/ 1310368 h 1316717"/>
+                  <a:gd name="connsiteX9" fmla="*/ 289403 w 571820"/>
+                  <a:gd name="connsiteY9" fmla="*/ 1316717 h 1316717"/>
+                  <a:gd name="connsiteX10" fmla="*/ 287393 w 571820"/>
+                  <a:gd name="connsiteY10" fmla="*/ 1314890 h 1316717"/>
+                  <a:gd name="connsiteX11" fmla="*/ 285910 w 571820"/>
+                  <a:gd name="connsiteY11" fmla="*/ 1313542 h 1316717"/>
+                  <a:gd name="connsiteX12" fmla="*/ 282417 w 571820"/>
+                  <a:gd name="connsiteY12" fmla="*/ 1316717 h 1316717"/>
+                  <a:gd name="connsiteX13" fmla="*/ 282417 w 571820"/>
+                  <a:gd name="connsiteY13" fmla="*/ 1310367 h 1316717"/>
+                  <a:gd name="connsiteX14" fmla="*/ 262617 w 571820"/>
+                  <a:gd name="connsiteY14" fmla="*/ 1292372 h 1316717"/>
+                  <a:gd name="connsiteX15" fmla="*/ 0 w 571820"/>
+                  <a:gd name="connsiteY15" fmla="*/ 658358 h 1316717"/>
+                  <a:gd name="connsiteX16" fmla="*/ 262617 w 571820"/>
+                  <a:gd name="connsiteY16" fmla="*/ 24345 h 1316717"/>
+                  <a:gd name="connsiteX0" fmla="*/ 262617 w 571820"/>
+                  <a:gd name="connsiteY0" fmla="*/ 24345 h 1316717"/>
+                  <a:gd name="connsiteX1" fmla="*/ 285910 w 571820"/>
+                  <a:gd name="connsiteY1" fmla="*/ 3175 h 1316717"/>
+                  <a:gd name="connsiteX2" fmla="*/ 287393 w 571820"/>
+                  <a:gd name="connsiteY2" fmla="*/ 1827 h 1316717"/>
+                  <a:gd name="connsiteX3" fmla="*/ 289403 w 571820"/>
+                  <a:gd name="connsiteY3" fmla="*/ 0 h 1316717"/>
+                  <a:gd name="connsiteX4" fmla="*/ 309203 w 571820"/>
+                  <a:gd name="connsiteY4" fmla="*/ 24345 h 1316717"/>
+                  <a:gd name="connsiteX5" fmla="*/ 571820 w 571820"/>
+                  <a:gd name="connsiteY5" fmla="*/ 658359 h 1316717"/>
+                  <a:gd name="connsiteX6" fmla="*/ 309203 w 571820"/>
+                  <a:gd name="connsiteY6" fmla="*/ 1292372 h 1316717"/>
+                  <a:gd name="connsiteX7" fmla="*/ 289403 w 571820"/>
+                  <a:gd name="connsiteY7" fmla="*/ 1310368 h 1316717"/>
+                  <a:gd name="connsiteX8" fmla="*/ 289403 w 571820"/>
+                  <a:gd name="connsiteY8" fmla="*/ 1316717 h 1316717"/>
+                  <a:gd name="connsiteX9" fmla="*/ 287393 w 571820"/>
+                  <a:gd name="connsiteY9" fmla="*/ 1314890 h 1316717"/>
+                  <a:gd name="connsiteX10" fmla="*/ 285910 w 571820"/>
+                  <a:gd name="connsiteY10" fmla="*/ 1313542 h 1316717"/>
+                  <a:gd name="connsiteX11" fmla="*/ 282417 w 571820"/>
+                  <a:gd name="connsiteY11" fmla="*/ 1316717 h 1316717"/>
+                  <a:gd name="connsiteX12" fmla="*/ 282417 w 571820"/>
+                  <a:gd name="connsiteY12" fmla="*/ 1310367 h 1316717"/>
+                  <a:gd name="connsiteX13" fmla="*/ 262617 w 571820"/>
+                  <a:gd name="connsiteY13" fmla="*/ 1292372 h 1316717"/>
+                  <a:gd name="connsiteX14" fmla="*/ 0 w 571820"/>
+                  <a:gd name="connsiteY14" fmla="*/ 658358 h 1316717"/>
+                  <a:gd name="connsiteX15" fmla="*/ 262617 w 571820"/>
+                  <a:gd name="connsiteY15" fmla="*/ 24345 h 1316717"/>
+                  <a:gd name="connsiteX0" fmla="*/ 262617 w 571820"/>
+                  <a:gd name="connsiteY0" fmla="*/ 22518 h 1314890"/>
+                  <a:gd name="connsiteX1" fmla="*/ 285910 w 571820"/>
+                  <a:gd name="connsiteY1" fmla="*/ 1348 h 1314890"/>
+                  <a:gd name="connsiteX2" fmla="*/ 287393 w 571820"/>
+                  <a:gd name="connsiteY2" fmla="*/ 0 h 1314890"/>
+                  <a:gd name="connsiteX3" fmla="*/ 309203 w 571820"/>
+                  <a:gd name="connsiteY3" fmla="*/ 22518 h 1314890"/>
+                  <a:gd name="connsiteX4" fmla="*/ 571820 w 571820"/>
+                  <a:gd name="connsiteY4" fmla="*/ 656532 h 1314890"/>
+                  <a:gd name="connsiteX5" fmla="*/ 309203 w 571820"/>
+                  <a:gd name="connsiteY5" fmla="*/ 1290545 h 1314890"/>
+                  <a:gd name="connsiteX6" fmla="*/ 289403 w 571820"/>
+                  <a:gd name="connsiteY6" fmla="*/ 1308541 h 1314890"/>
+                  <a:gd name="connsiteX7" fmla="*/ 289403 w 571820"/>
+                  <a:gd name="connsiteY7" fmla="*/ 1314890 h 1314890"/>
+                  <a:gd name="connsiteX8" fmla="*/ 287393 w 571820"/>
+                  <a:gd name="connsiteY8" fmla="*/ 1313063 h 1314890"/>
+                  <a:gd name="connsiteX9" fmla="*/ 285910 w 571820"/>
+                  <a:gd name="connsiteY9" fmla="*/ 1311715 h 1314890"/>
+                  <a:gd name="connsiteX10" fmla="*/ 282417 w 571820"/>
+                  <a:gd name="connsiteY10" fmla="*/ 1314890 h 1314890"/>
+                  <a:gd name="connsiteX11" fmla="*/ 282417 w 571820"/>
+                  <a:gd name="connsiteY11" fmla="*/ 1308540 h 1314890"/>
+                  <a:gd name="connsiteX12" fmla="*/ 262617 w 571820"/>
+                  <a:gd name="connsiteY12" fmla="*/ 1290545 h 1314890"/>
+                  <a:gd name="connsiteX13" fmla="*/ 0 w 571820"/>
+                  <a:gd name="connsiteY13" fmla="*/ 656531 h 1314890"/>
+                  <a:gd name="connsiteX14" fmla="*/ 262617 w 571820"/>
+                  <a:gd name="connsiteY14" fmla="*/ 22518 h 1314890"/>
+                  <a:gd name="connsiteX0" fmla="*/ 262617 w 571820"/>
+                  <a:gd name="connsiteY0" fmla="*/ 21170 h 1313542"/>
+                  <a:gd name="connsiteX1" fmla="*/ 285910 w 571820"/>
+                  <a:gd name="connsiteY1" fmla="*/ 0 h 1313542"/>
+                  <a:gd name="connsiteX2" fmla="*/ 309203 w 571820"/>
+                  <a:gd name="connsiteY2" fmla="*/ 21170 h 1313542"/>
+                  <a:gd name="connsiteX3" fmla="*/ 571820 w 571820"/>
+                  <a:gd name="connsiteY3" fmla="*/ 655184 h 1313542"/>
+                  <a:gd name="connsiteX4" fmla="*/ 309203 w 571820"/>
+                  <a:gd name="connsiteY4" fmla="*/ 1289197 h 1313542"/>
+                  <a:gd name="connsiteX5" fmla="*/ 289403 w 571820"/>
+                  <a:gd name="connsiteY5" fmla="*/ 1307193 h 1313542"/>
+                  <a:gd name="connsiteX6" fmla="*/ 289403 w 571820"/>
+                  <a:gd name="connsiteY6" fmla="*/ 1313542 h 1313542"/>
+                  <a:gd name="connsiteX7" fmla="*/ 287393 w 571820"/>
+                  <a:gd name="connsiteY7" fmla="*/ 1311715 h 1313542"/>
+                  <a:gd name="connsiteX8" fmla="*/ 285910 w 571820"/>
+                  <a:gd name="connsiteY8" fmla="*/ 1310367 h 1313542"/>
+                  <a:gd name="connsiteX9" fmla="*/ 282417 w 571820"/>
+                  <a:gd name="connsiteY9" fmla="*/ 1313542 h 1313542"/>
+                  <a:gd name="connsiteX10" fmla="*/ 282417 w 571820"/>
+                  <a:gd name="connsiteY10" fmla="*/ 1307192 h 1313542"/>
+                  <a:gd name="connsiteX11" fmla="*/ 262617 w 571820"/>
+                  <a:gd name="connsiteY11" fmla="*/ 1289197 h 1313542"/>
+                  <a:gd name="connsiteX12" fmla="*/ 0 w 571820"/>
+                  <a:gd name="connsiteY12" fmla="*/ 655183 h 1313542"/>
+                  <a:gd name="connsiteX13" fmla="*/ 262617 w 571820"/>
+                  <a:gd name="connsiteY13" fmla="*/ 21170 h 1313542"/>
+                  <a:gd name="connsiteX0" fmla="*/ 262617 w 571820"/>
+                  <a:gd name="connsiteY0" fmla="*/ 21170 h 1313542"/>
+                  <a:gd name="connsiteX1" fmla="*/ 285910 w 571820"/>
+                  <a:gd name="connsiteY1" fmla="*/ 0 h 1313542"/>
+                  <a:gd name="connsiteX2" fmla="*/ 309203 w 571820"/>
+                  <a:gd name="connsiteY2" fmla="*/ 21170 h 1313542"/>
+                  <a:gd name="connsiteX3" fmla="*/ 571820 w 571820"/>
+                  <a:gd name="connsiteY3" fmla="*/ 655184 h 1313542"/>
+                  <a:gd name="connsiteX4" fmla="*/ 309203 w 571820"/>
+                  <a:gd name="connsiteY4" fmla="*/ 1289197 h 1313542"/>
+                  <a:gd name="connsiteX5" fmla="*/ 289403 w 571820"/>
+                  <a:gd name="connsiteY5" fmla="*/ 1307193 h 1313542"/>
+                  <a:gd name="connsiteX6" fmla="*/ 289403 w 571820"/>
+                  <a:gd name="connsiteY6" fmla="*/ 1313542 h 1313542"/>
+                  <a:gd name="connsiteX7" fmla="*/ 287393 w 571820"/>
+                  <a:gd name="connsiteY7" fmla="*/ 1311715 h 1313542"/>
+                  <a:gd name="connsiteX8" fmla="*/ 285910 w 571820"/>
+                  <a:gd name="connsiteY8" fmla="*/ 1310367 h 1313542"/>
+                  <a:gd name="connsiteX9" fmla="*/ 282417 w 571820"/>
+                  <a:gd name="connsiteY9" fmla="*/ 1313542 h 1313542"/>
+                  <a:gd name="connsiteX10" fmla="*/ 262617 w 571820"/>
+                  <a:gd name="connsiteY10" fmla="*/ 1289197 h 1313542"/>
+                  <a:gd name="connsiteX11" fmla="*/ 0 w 571820"/>
+                  <a:gd name="connsiteY11" fmla="*/ 655183 h 1313542"/>
+                  <a:gd name="connsiteX12" fmla="*/ 262617 w 571820"/>
+                  <a:gd name="connsiteY12" fmla="*/ 21170 h 1313542"/>
+                  <a:gd name="connsiteX0" fmla="*/ 262617 w 571820"/>
+                  <a:gd name="connsiteY0" fmla="*/ 21170 h 1313542"/>
+                  <a:gd name="connsiteX1" fmla="*/ 285910 w 571820"/>
+                  <a:gd name="connsiteY1" fmla="*/ 0 h 1313542"/>
+                  <a:gd name="connsiteX2" fmla="*/ 309203 w 571820"/>
+                  <a:gd name="connsiteY2" fmla="*/ 21170 h 1313542"/>
+                  <a:gd name="connsiteX3" fmla="*/ 571820 w 571820"/>
+                  <a:gd name="connsiteY3" fmla="*/ 655184 h 1313542"/>
+                  <a:gd name="connsiteX4" fmla="*/ 309203 w 571820"/>
+                  <a:gd name="connsiteY4" fmla="*/ 1289197 h 1313542"/>
+                  <a:gd name="connsiteX5" fmla="*/ 289403 w 571820"/>
+                  <a:gd name="connsiteY5" fmla="*/ 1307193 h 1313542"/>
+                  <a:gd name="connsiteX6" fmla="*/ 289403 w 571820"/>
+                  <a:gd name="connsiteY6" fmla="*/ 1313542 h 1313542"/>
+                  <a:gd name="connsiteX7" fmla="*/ 287393 w 571820"/>
+                  <a:gd name="connsiteY7" fmla="*/ 1311715 h 1313542"/>
+                  <a:gd name="connsiteX8" fmla="*/ 285910 w 571820"/>
+                  <a:gd name="connsiteY8" fmla="*/ 1310367 h 1313542"/>
+                  <a:gd name="connsiteX9" fmla="*/ 262617 w 571820"/>
+                  <a:gd name="connsiteY9" fmla="*/ 1289197 h 1313542"/>
+                  <a:gd name="connsiteX10" fmla="*/ 0 w 571820"/>
+                  <a:gd name="connsiteY10" fmla="*/ 655183 h 1313542"/>
+                  <a:gd name="connsiteX11" fmla="*/ 262617 w 571820"/>
+                  <a:gd name="connsiteY11" fmla="*/ 21170 h 1313542"/>
+                  <a:gd name="connsiteX0" fmla="*/ 262617 w 571820"/>
+                  <a:gd name="connsiteY0" fmla="*/ 21170 h 1313542"/>
+                  <a:gd name="connsiteX1" fmla="*/ 285910 w 571820"/>
+                  <a:gd name="connsiteY1" fmla="*/ 0 h 1313542"/>
+                  <a:gd name="connsiteX2" fmla="*/ 309203 w 571820"/>
+                  <a:gd name="connsiteY2" fmla="*/ 21170 h 1313542"/>
+                  <a:gd name="connsiteX3" fmla="*/ 571820 w 571820"/>
+                  <a:gd name="connsiteY3" fmla="*/ 655184 h 1313542"/>
+                  <a:gd name="connsiteX4" fmla="*/ 309203 w 571820"/>
+                  <a:gd name="connsiteY4" fmla="*/ 1289197 h 1313542"/>
+                  <a:gd name="connsiteX5" fmla="*/ 289403 w 571820"/>
+                  <a:gd name="connsiteY5" fmla="*/ 1307193 h 1313542"/>
+                  <a:gd name="connsiteX6" fmla="*/ 289403 w 571820"/>
+                  <a:gd name="connsiteY6" fmla="*/ 1313542 h 1313542"/>
+                  <a:gd name="connsiteX7" fmla="*/ 287393 w 571820"/>
+                  <a:gd name="connsiteY7" fmla="*/ 1311715 h 1313542"/>
+                  <a:gd name="connsiteX8" fmla="*/ 262617 w 571820"/>
+                  <a:gd name="connsiteY8" fmla="*/ 1289197 h 1313542"/>
+                  <a:gd name="connsiteX9" fmla="*/ 0 w 571820"/>
+                  <a:gd name="connsiteY9" fmla="*/ 655183 h 1313542"/>
+                  <a:gd name="connsiteX10" fmla="*/ 262617 w 571820"/>
+                  <a:gd name="connsiteY10" fmla="*/ 21170 h 1313542"/>
+                  <a:gd name="connsiteX0" fmla="*/ 262617 w 571820"/>
+                  <a:gd name="connsiteY0" fmla="*/ 21170 h 1313542"/>
+                  <a:gd name="connsiteX1" fmla="*/ 285910 w 571820"/>
+                  <a:gd name="connsiteY1" fmla="*/ 0 h 1313542"/>
+                  <a:gd name="connsiteX2" fmla="*/ 309203 w 571820"/>
+                  <a:gd name="connsiteY2" fmla="*/ 21170 h 1313542"/>
+                  <a:gd name="connsiteX3" fmla="*/ 571820 w 571820"/>
+                  <a:gd name="connsiteY3" fmla="*/ 655184 h 1313542"/>
+                  <a:gd name="connsiteX4" fmla="*/ 309203 w 571820"/>
+                  <a:gd name="connsiteY4" fmla="*/ 1289197 h 1313542"/>
+                  <a:gd name="connsiteX5" fmla="*/ 289403 w 571820"/>
+                  <a:gd name="connsiteY5" fmla="*/ 1307193 h 1313542"/>
+                  <a:gd name="connsiteX6" fmla="*/ 289403 w 571820"/>
+                  <a:gd name="connsiteY6" fmla="*/ 1313542 h 1313542"/>
+                  <a:gd name="connsiteX7" fmla="*/ 262617 w 571820"/>
+                  <a:gd name="connsiteY7" fmla="*/ 1289197 h 1313542"/>
+                  <a:gd name="connsiteX8" fmla="*/ 0 w 571820"/>
+                  <a:gd name="connsiteY8" fmla="*/ 655183 h 1313542"/>
+                  <a:gd name="connsiteX9" fmla="*/ 262617 w 571820"/>
+                  <a:gd name="connsiteY9" fmla="*/ 21170 h 1313542"/>
+                  <a:gd name="connsiteX0" fmla="*/ 262617 w 571820"/>
+                  <a:gd name="connsiteY0" fmla="*/ 21170 h 1364739"/>
+                  <a:gd name="connsiteX1" fmla="*/ 285910 w 571820"/>
+                  <a:gd name="connsiteY1" fmla="*/ 0 h 1364739"/>
+                  <a:gd name="connsiteX2" fmla="*/ 309203 w 571820"/>
+                  <a:gd name="connsiteY2" fmla="*/ 21170 h 1364739"/>
+                  <a:gd name="connsiteX3" fmla="*/ 571820 w 571820"/>
+                  <a:gd name="connsiteY3" fmla="*/ 655184 h 1364739"/>
+                  <a:gd name="connsiteX4" fmla="*/ 309203 w 571820"/>
+                  <a:gd name="connsiteY4" fmla="*/ 1289197 h 1364739"/>
+                  <a:gd name="connsiteX5" fmla="*/ 289403 w 571820"/>
+                  <a:gd name="connsiteY5" fmla="*/ 1307193 h 1364739"/>
+                  <a:gd name="connsiteX6" fmla="*/ 177485 w 571820"/>
+                  <a:gd name="connsiteY6" fmla="*/ 1364739 h 1364739"/>
+                  <a:gd name="connsiteX7" fmla="*/ 262617 w 571820"/>
+                  <a:gd name="connsiteY7" fmla="*/ 1289197 h 1364739"/>
+                  <a:gd name="connsiteX8" fmla="*/ 0 w 571820"/>
+                  <a:gd name="connsiteY8" fmla="*/ 655183 h 1364739"/>
+                  <a:gd name="connsiteX9" fmla="*/ 262617 w 571820"/>
+                  <a:gd name="connsiteY9" fmla="*/ 21170 h 1364739"/>
+                  <a:gd name="connsiteX0" fmla="*/ 262617 w 571820"/>
+                  <a:gd name="connsiteY0" fmla="*/ 21170 h 1364739"/>
+                  <a:gd name="connsiteX1" fmla="*/ 285910 w 571820"/>
+                  <a:gd name="connsiteY1" fmla="*/ 0 h 1364739"/>
+                  <a:gd name="connsiteX2" fmla="*/ 309203 w 571820"/>
+                  <a:gd name="connsiteY2" fmla="*/ 21170 h 1364739"/>
+                  <a:gd name="connsiteX3" fmla="*/ 571820 w 571820"/>
+                  <a:gd name="connsiteY3" fmla="*/ 655184 h 1364739"/>
+                  <a:gd name="connsiteX4" fmla="*/ 309203 w 571820"/>
+                  <a:gd name="connsiteY4" fmla="*/ 1289197 h 1364739"/>
+                  <a:gd name="connsiteX5" fmla="*/ 285832 w 571820"/>
+                  <a:gd name="connsiteY5" fmla="*/ 1311956 h 1364739"/>
+                  <a:gd name="connsiteX6" fmla="*/ 177485 w 571820"/>
+                  <a:gd name="connsiteY6" fmla="*/ 1364739 h 1364739"/>
+                  <a:gd name="connsiteX7" fmla="*/ 262617 w 571820"/>
+                  <a:gd name="connsiteY7" fmla="*/ 1289197 h 1364739"/>
+                  <a:gd name="connsiteX8" fmla="*/ 0 w 571820"/>
+                  <a:gd name="connsiteY8" fmla="*/ 655183 h 1364739"/>
+                  <a:gd name="connsiteX9" fmla="*/ 262617 w 571820"/>
+                  <a:gd name="connsiteY9" fmla="*/ 21170 h 1364739"/>
+                  <a:gd name="connsiteX0" fmla="*/ 262617 w 571820"/>
+                  <a:gd name="connsiteY0" fmla="*/ 21170 h 1311956"/>
+                  <a:gd name="connsiteX1" fmla="*/ 285910 w 571820"/>
+                  <a:gd name="connsiteY1" fmla="*/ 0 h 1311956"/>
+                  <a:gd name="connsiteX2" fmla="*/ 309203 w 571820"/>
+                  <a:gd name="connsiteY2" fmla="*/ 21170 h 1311956"/>
+                  <a:gd name="connsiteX3" fmla="*/ 571820 w 571820"/>
+                  <a:gd name="connsiteY3" fmla="*/ 655184 h 1311956"/>
+                  <a:gd name="connsiteX4" fmla="*/ 309203 w 571820"/>
+                  <a:gd name="connsiteY4" fmla="*/ 1289197 h 1311956"/>
+                  <a:gd name="connsiteX5" fmla="*/ 285832 w 571820"/>
+                  <a:gd name="connsiteY5" fmla="*/ 1311956 h 1311956"/>
+                  <a:gd name="connsiteX6" fmla="*/ 262617 w 571820"/>
+                  <a:gd name="connsiteY6" fmla="*/ 1289197 h 1311956"/>
+                  <a:gd name="connsiteX7" fmla="*/ 0 w 571820"/>
+                  <a:gd name="connsiteY7" fmla="*/ 655183 h 1311956"/>
+                  <a:gd name="connsiteX8" fmla="*/ 262617 w 571820"/>
+                  <a:gd name="connsiteY8" fmla="*/ 21170 h 1311956"/>
+                </a:gdLst>
+                <a:ahLst/>
+                <a:cxnLst>
+                  <a:cxn ang="0">
+                    <a:pos x="connsiteX0" y="connsiteY0"/>
+                  </a:cxn>
+                  <a:cxn ang="0">
+                    <a:pos x="connsiteX1" y="connsiteY1"/>
+                  </a:cxn>
+                  <a:cxn ang="0">
+                    <a:pos x="connsiteX2" y="connsiteY2"/>
+                  </a:cxn>
+                  <a:cxn ang="0">
+                    <a:pos x="connsiteX3" y="connsiteY3"/>
+                  </a:cxn>
+                  <a:cxn ang="0">
+                    <a:pos x="connsiteX4" y="connsiteY4"/>
+                  </a:cxn>
+                  <a:cxn ang="0">
+                    <a:pos x="connsiteX5" y="connsiteY5"/>
+                  </a:cxn>
+                  <a:cxn ang="0">
+                    <a:pos x="connsiteX6" y="connsiteY6"/>
+                  </a:cxn>
+                  <a:cxn ang="0">
+                    <a:pos x="connsiteX7" y="connsiteY7"/>
+                  </a:cxn>
+                  <a:cxn ang="0">
+                    <a:pos x="connsiteX8" y="connsiteY8"/>
+                  </a:cxn>
+                </a:cxnLst>
+                <a:rect l="l" t="t" r="r" b="b"/>
+                <a:pathLst>
+                  <a:path w="571820" h="1311956">
+                    <a:moveTo>
+                      <a:pt x="262617" y="21170"/>
+                    </a:moveTo>
+                    <a:lnTo>
+                      <a:pt x="285910" y="0"/>
+                    </a:lnTo>
+                    <a:lnTo>
+                      <a:pt x="309203" y="21170"/>
+                    </a:lnTo>
+                    <a:cubicBezTo>
+                      <a:pt x="471461" y="183428"/>
+                      <a:pt x="571820" y="407586"/>
+                      <a:pt x="571820" y="655184"/>
+                    </a:cubicBezTo>
+                    <a:cubicBezTo>
+                      <a:pt x="571820" y="902781"/>
+                      <a:pt x="471461" y="1126939"/>
+                      <a:pt x="309203" y="1289197"/>
+                    </a:cubicBezTo>
+                    <a:lnTo>
+                      <a:pt x="285832" y="1311956"/>
+                    </a:lnTo>
+                    <a:lnTo>
+                      <a:pt x="262617" y="1289197"/>
+                    </a:lnTo>
+                    <a:cubicBezTo>
+                      <a:pt x="100359" y="1126938"/>
+                      <a:pt x="0" y="902781"/>
+                      <a:pt x="0" y="655183"/>
+                    </a:cubicBezTo>
+                    <a:cubicBezTo>
+                      <a:pt x="0" y="407586"/>
+                      <a:pt x="100359" y="183428"/>
+                      <a:pt x="262617" y="21170"/>
+                    </a:cubicBezTo>
+                    <a:close/>
+                  </a:path>
+                </a:pathLst>
+              </a:custGeom>
+              <a:noFill/>
+              <a:ln w="12700">
+                <a:solidFill>
+                  <a:schemeClr val="tx1"/>
+                </a:solidFill>
+              </a:ln>
+            </p:spPr>
+            <p:style>
+              <a:lnRef idx="2">
+                <a:schemeClr val="accent1">
+                  <a:shade val="50000"/>
+                </a:schemeClr>
+              </a:lnRef>
+              <a:fillRef idx="1">
+                <a:schemeClr val="accent1"/>
+              </a:fillRef>
+              <a:effectRef idx="0">
+                <a:schemeClr val="accent1"/>
+              </a:effectRef>
+              <a:fontRef idx="minor">
+                <a:schemeClr val="lt1"/>
+              </a:fontRef>
+            </p:style>
+            <p:txBody>
+              <a:bodyPr rtlCol="0" anchor="ctr"/>
+              <a:lstStyle/>
+              <a:p>
+                <a:pPr algn="ctr"/>
+                <a:endParaRPr lang="en-US">
+                  <a:solidFill>
+                    <a:schemeClr val="tx1"/>
+                  </a:solidFill>
+                </a:endParaRPr>
+              </a:p>
+            </p:txBody>
+          </p:sp>
+          <p:cxnSp>
+            <p:nvCxnSpPr>
+              <p:cNvPr id="30" name="Straight Connector 29">
+                <a:extLst>
+                  <a:ext uri="{FF2B5EF4-FFF2-40B4-BE49-F238E27FC236}">
+                    <a16:creationId xmlns:a16="http://schemas.microsoft.com/office/drawing/2014/main" id="{803A57D6-0C36-4560-A08A-16768551EF6F}"/>
+                  </a:ext>
+                  <a:ext uri="{C183D7F6-B498-43B3-948B-1728B52AA6E4}">
+                    <adec:decorative xmlns:adec="http://schemas.microsoft.com/office/drawing/2017/decorative" val="1"/>
+                  </a:ext>
+                </a:extLst>
+              </p:cNvPr>
+              <p:cNvCxnSpPr>
+                <a:cxnSpLocks/>
+              </p:cNvCxnSpPr>
+              <p:nvPr>
+                <p:extLst>
+                  <p:ext uri="{386F3935-93C4-4BCD-93E2-E3B085C9AB24}">
+                    <p16:designElem xmlns:p16="http://schemas.microsoft.com/office/powerpoint/2015/main" val="1"/>
+                  </p:ext>
+                </p:extLst>
+              </p:nvPr>
+            </p:nvCxnSpPr>
+            <p:spPr>
+              <a:xfrm>
+                <a:off x="8768695" y="4330454"/>
+                <a:ext cx="0" cy="1620000"/>
+              </a:xfrm>
+              <a:prstGeom prst="line">
+                <a:avLst/>
+              </a:prstGeom>
+              <a:ln w="12700">
+                <a:solidFill>
+                  <a:schemeClr val="tx1"/>
+                </a:solidFill>
+              </a:ln>
+            </p:spPr>
+            <p:style>
+              <a:lnRef idx="1">
+                <a:schemeClr val="accent1"/>
+              </a:lnRef>
+              <a:fillRef idx="0">
+                <a:schemeClr val="accent1"/>
+              </a:fillRef>
+              <a:effectRef idx="0">
+                <a:schemeClr val="accent1"/>
+              </a:effectRef>
+              <a:fontRef idx="minor">
+                <a:schemeClr val="tx1"/>
+              </a:fontRef>
+            </p:style>
+          </p:cxnSp>
+        </p:grpSp>
+      </p:grpSp>
+      <p:sp useBgFill="1">
+        <p:nvSpPr>
+          <p:cNvPr id="32" name="Rectangle 31">
+            <a:extLst>
+              <a:ext uri="{FF2B5EF4-FFF2-40B4-BE49-F238E27FC236}">
+                <a16:creationId xmlns:a16="http://schemas.microsoft.com/office/drawing/2014/main" id="{CA5B2A81-2C8E-4963-AFD4-E539D168B475}"/>
+              </a:ext>
+              <a:ext uri="{C183D7F6-B498-43B3-948B-1728B52AA6E4}">
+                <adec:decorative xmlns:adec="http://schemas.microsoft.com/office/drawing/2017/decorative" val="1"/>
+              </a:ext>
+            </a:extLst>
+          </p:cNvPr>
+          <p:cNvSpPr>
+            <a:spLocks noGrp="1" noRot="1" noChangeAspect="1" noMove="1" noResize="1" noEditPoints="1" noAdjustHandles="1" noChangeArrowheads="1" noChangeShapeType="1" noTextEdit="1"/>
+          </p:cNvSpPr>
+          <p:nvPr>
+            <p:extLst>
+              <p:ext uri="{386F3935-93C4-4BCD-93E2-E3B085C9AB24}">
+                <p16:designElem xmlns:p16="http://schemas.microsoft.com/office/powerpoint/2015/main" val="1"/>
+              </p:ext>
+            </p:extLst>
+          </p:nvPr>
+        </p:nvSpPr>
+        <p:spPr>
+          <a:xfrm>
+            <a:off x="0" y="0"/>
+            <a:ext cx="12192000" cy="6858000"/>
+          </a:xfrm>
+          <a:prstGeom prst="rect">
+            <a:avLst/>
+          </a:prstGeom>
+          <a:ln w="12700" cap="flat" cmpd="sng" algn="ctr">
+            <a:noFill/>
+            <a:prstDash val="solid"/>
+            <a:miter lim="800000"/>
+          </a:ln>
+          <a:effectLst/>
+          <a:extLst>
+            <a:ext uri="{91240B29-F687-4F45-9708-019B960494DF}">
+              <a14:hiddenLine xmlns:a14="http://schemas.microsoft.com/office/drawing/2010/main" w="12700" cap="flat" cmpd="sng" algn="ctr">
+                <a:solidFill>
+                  <a:schemeClr val="accent1">
+                    <a:shade val="50000"/>
+                  </a:schemeClr>
+                </a:solidFill>
+                <a:prstDash val="solid"/>
+                <a:miter lim="800000"/>
+              </a14:hiddenLine>
+            </a:ext>
+          </a:extLst>
+        </p:spPr>
+        <p:style>
+          <a:lnRef idx="2">
+            <a:schemeClr val="accent1">
+              <a:shade val="50000"/>
+            </a:schemeClr>
+          </a:lnRef>
+          <a:fillRef idx="1">
+            <a:schemeClr val="accent1"/>
+          </a:fillRef>
+          <a:effectRef idx="0">
+            <a:schemeClr val="accent1"/>
+          </a:effectRef>
+          <a:fontRef idx="minor">
+            <a:schemeClr val="lt1"/>
+          </a:fontRef>
+        </p:style>
+        <p:txBody>
+          <a:bodyPr rtlCol="0" anchor="ctr"/>
+          <a:lstStyle/>
+          <a:p>
+            <a:pPr algn="ctr"/>
+            <a:endParaRPr lang="en-US"/>
           </a:p>
         </p:txBody>
       </p:sp>
       <p:sp>
         <p:nvSpPr>
-          <p:cNvPr id="7" name="Content Placeholder 6">
-            <a:extLst>
-              <a:ext uri="{FF2B5EF4-FFF2-40B4-BE49-F238E27FC236}">
-                <a16:creationId xmlns:a16="http://schemas.microsoft.com/office/drawing/2014/main" id="{46C7DCB7-F220-E740-848D-A1693EBB584E}"/>
+          <p:cNvPr id="2" name="Title 1">
+            <a:extLst>
+              <a:ext uri="{FF2B5EF4-FFF2-40B4-BE49-F238E27FC236}">
+                <a16:creationId xmlns:a16="http://schemas.microsoft.com/office/drawing/2014/main" id="{4D2BA7B0-75C8-A24B-8ED1-93421206F4FB}"/>
               </a:ext>
             </a:extLst>
           </p:cNvPr>
@@ -8403,22 +9152,114 @@
             <a:spLocks noGrp="1"/>
           </p:cNvSpPr>
           <p:nvPr>
-            <p:ph idx="1"/>
+            <p:ph type="title"/>
           </p:nvPr>
         </p:nvSpPr>
-        <p:spPr/>
+        <p:spPr>
+          <a:xfrm>
+            <a:off x="4983900" y="1079500"/>
+            <a:ext cx="6119131" cy="2138400"/>
+          </a:xfrm>
+        </p:spPr>
         <p:txBody>
-          <a:bodyPr/>
+          <a:bodyPr vert="horz" lIns="0" tIns="0" rIns="0" bIns="0" rtlCol="0" anchor="b" anchorCtr="0">
+            <a:normAutofit/>
+          </a:bodyPr>
           <a:lstStyle/>
           <a:p>
-            <a:endParaRPr lang="en-CH"/>
+            <a:pPr algn="ctr"/>
+            <a:r>
+              <a:rPr lang="en-US" dirty="0"/>
+              <a:t>Thank you for your attention</a:t>
+            </a:r>
           </a:p>
         </p:txBody>
       </p:sp>
+      <p:pic>
+        <p:nvPicPr>
+          <p:cNvPr id="20" name="Picture 19">
+            <a:extLst>
+              <a:ext uri="{FF2B5EF4-FFF2-40B4-BE49-F238E27FC236}">
+                <a16:creationId xmlns:a16="http://schemas.microsoft.com/office/drawing/2014/main" id="{28141A80-C3AD-4429-A37F-C38271D461F5}"/>
+              </a:ext>
+            </a:extLst>
+          </p:cNvPr>
+          <p:cNvPicPr>
+            <a:picLocks noChangeAspect="1"/>
+          </p:cNvPicPr>
+          <p:nvPr/>
+        </p:nvPicPr>
+        <p:blipFill rotWithShape="1">
+          <a:blip r:embed="rId2"/>
+          <a:srcRect l="27369" r="16289"/>
+          <a:stretch/>
+        </p:blipFill>
+        <p:spPr>
+          <a:xfrm>
+            <a:off x="20" y="10"/>
+            <a:ext cx="3863955" cy="6857989"/>
+          </a:xfrm>
+          <a:prstGeom prst="rect">
+            <a:avLst/>
+          </a:prstGeom>
+        </p:spPr>
+      </p:pic>
+      <p:cxnSp>
+        <p:nvCxnSpPr>
+          <p:cNvPr id="34" name="Straight Connector 33">
+            <a:extLst>
+              <a:ext uri="{FF2B5EF4-FFF2-40B4-BE49-F238E27FC236}">
+                <a16:creationId xmlns:a16="http://schemas.microsoft.com/office/drawing/2014/main" id="{9E7C23BC-DAA6-40E1-8166-B8C4439D1430}"/>
+              </a:ext>
+              <a:ext uri="{C183D7F6-B498-43B3-948B-1728B52AA6E4}">
+                <adec:decorative xmlns:adec="http://schemas.microsoft.com/office/drawing/2017/decorative" val="1"/>
+              </a:ext>
+            </a:extLst>
+          </p:cNvPr>
+          <p:cNvCxnSpPr>
+            <a:cxnSpLocks noGrp="1" noRot="1" noChangeAspect="1" noMove="1" noResize="1" noEditPoints="1" noAdjustHandles="1" noChangeArrowheads="1" noChangeShapeType="1"/>
+          </p:cNvCxnSpPr>
+          <p:nvPr>
+            <p:extLst>
+              <p:ext uri="{386F3935-93C4-4BCD-93E2-E3B085C9AB24}">
+                <p16:designElem xmlns:p16="http://schemas.microsoft.com/office/powerpoint/2015/main" val="1"/>
+              </p:ext>
+            </p:extLst>
+          </p:nvPr>
+        </p:nvCxnSpPr>
+        <p:spPr>
+          <a:xfrm>
+            <a:off x="7773465" y="3690871"/>
+            <a:ext cx="540000" cy="0"/>
+          </a:xfrm>
+          <a:prstGeom prst="line">
+            <a:avLst/>
+          </a:prstGeom>
+          <a:ln w="12700">
+            <a:solidFill>
+              <a:schemeClr val="tx1"/>
+            </a:solidFill>
+          </a:ln>
+        </p:spPr>
+        <p:style>
+          <a:lnRef idx="1">
+            <a:schemeClr val="accent1"/>
+          </a:lnRef>
+          <a:fillRef idx="0">
+            <a:schemeClr val="accent1"/>
+          </a:fillRef>
+          <a:effectRef idx="0">
+            <a:schemeClr val="accent1"/>
+          </a:effectRef>
+          <a:fontRef idx="minor">
+            <a:schemeClr val="tx1"/>
+          </a:fontRef>
+        </p:style>
+      </p:cxnSp>
     </p:spTree>
     <p:extLst>
       <p:ext uri="{BB962C8B-B14F-4D97-AF65-F5344CB8AC3E}">
-        <p14:creationId xmlns:p14="http://schemas.microsoft.com/office/powerpoint/2010/main" val="1974929923"/>
+        <p14:creationId xmlns:p14="http://schemas.microsoft.com/office/powerpoint/2010/main" val="4063716037"/>
       </p:ext>
     </p:extLst>
   </p:cSld>
@@ -10761,7 +11602,7 @@
 </file>
 
 <file path=ppt/slides/slide9.xml><?xml version="1.0" encoding="utf-8"?>
-<p:sld xmlns:a="http://schemas.openxmlformats.org/drawingml/2006/main" xmlns:r="http://schemas.openxmlformats.org/officeDocument/2006/relationships" xmlns:p="http://schemas.openxmlformats.org/presentationml/2006/main" show="0">
+<p:sld xmlns:a="http://schemas.openxmlformats.org/drawingml/2006/main" xmlns:r="http://schemas.openxmlformats.org/officeDocument/2006/relationships" xmlns:p="http://schemas.openxmlformats.org/presentationml/2006/main">
   <p:cSld>
     <p:spTree>
       <p:nvGrpSpPr>
@@ -10782,7 +11623,7 @@
           <p:cNvPr id="2" name="Title 1">
             <a:extLst>
               <a:ext uri="{FF2B5EF4-FFF2-40B4-BE49-F238E27FC236}">
-                <a16:creationId xmlns:a16="http://schemas.microsoft.com/office/drawing/2014/main" id="{23BCB6AC-DD57-1149-9F51-4B12017360A7}"/>
+                <a16:creationId xmlns:a16="http://schemas.microsoft.com/office/drawing/2014/main" id="{8EACBC7C-1508-DE47-9E7A-4F0D2693770C}"/>
               </a:ext>
             </a:extLst>
           </p:cNvPr>
@@ -10801,86 +11642,19 @@
           <a:lstStyle/>
           <a:p>
             <a:r>
-              <a:rPr lang="en-CH" dirty="0"/>
-              <a:t>Data visualization – by Gender</a:t>
-            </a:r>
-          </a:p>
-        </p:txBody>
-      </p:sp>
-      <p:sp>
-        <p:nvSpPr>
-          <p:cNvPr id="3" name="Content Placeholder 2">
-            <a:extLst>
-              <a:ext uri="{FF2B5EF4-FFF2-40B4-BE49-F238E27FC236}">
-                <a16:creationId xmlns:a16="http://schemas.microsoft.com/office/drawing/2014/main" id="{79A9425A-062D-D545-A18A-44226D2EBAD3}"/>
-              </a:ext>
-            </a:extLst>
-          </p:cNvPr>
-          <p:cNvSpPr>
-            <a:spLocks noGrp="1"/>
-          </p:cNvSpPr>
-          <p:nvPr>
-            <p:ph idx="1"/>
-          </p:nvPr>
-        </p:nvSpPr>
-        <p:spPr/>
-        <p:txBody>
-          <a:bodyPr>
-            <a:noAutofit/>
-          </a:bodyPr>
-          <a:lstStyle/>
-          <a:p>
-            <a:r>
-              <a:rPr lang="en-CH" dirty="0"/>
-              <a:t>Some of the variables had a division by gender</a:t>
-            </a:r>
-          </a:p>
-          <a:p>
-            <a:r>
-              <a:rPr lang="en-CH" dirty="0"/>
-              <a:t>Smoking has no correlation to number of suicides</a:t>
-            </a:r>
-          </a:p>
-          <a:p>
-            <a:pPr lvl="2"/>
-            <a:r>
-              <a:rPr lang="en-CH" dirty="0"/>
-              <a:t>Average smokers larger tandancy to commit suicid</a:t>
-            </a:r>
-            <a:r>
               <a:rPr lang="fr-BE" dirty="0"/>
-              <a:t>e</a:t>
-            </a:r>
-          </a:p>
-          <a:p>
-            <a:r>
-              <a:rPr lang="en-CH" dirty="0"/>
-              <a:t>There is a small amount of correlation between unemployment and number of suicides but almost neglegable</a:t>
-            </a:r>
-          </a:p>
-          <a:p>
-            <a:r>
-              <a:rPr lang="en-GB" dirty="0"/>
-              <a:t>For alcohol we decided to do a log-log analysis</a:t>
+              <a:t>GRAPH : Suicide BY Smoking</a:t>
             </a:r>
             <a:endParaRPr lang="en-CH" dirty="0"/>
-          </a:p>
-          <a:p>
-            <a:pPr lvl="2"/>
-            <a:r>
-              <a:rPr lang="en-CH" dirty="0"/>
-              <a:t>Definite correlation between alcohol consumption and suicide rate</a:t>
-            </a:r>
-            <a:endParaRPr lang="en-GB" dirty="0"/>
           </a:p>
         </p:txBody>
       </p:sp>
       <p:pic>
         <p:nvPicPr>
-          <p:cNvPr id="5" name="Graphique 4" descr="Masculin avec un remplissage uni">
-            <a:extLst>
-              <a:ext uri="{FF2B5EF4-FFF2-40B4-BE49-F238E27FC236}">
-                <a16:creationId xmlns:a16="http://schemas.microsoft.com/office/drawing/2014/main" id="{42B60995-2E26-457F-913F-8B9AC3FE8913}"/>
+          <p:cNvPr id="5" name="Graphic 4">
+            <a:extLst>
+              <a:ext uri="{FF2B5EF4-FFF2-40B4-BE49-F238E27FC236}">
+                <a16:creationId xmlns:a16="http://schemas.microsoft.com/office/drawing/2014/main" id="{45C1EB94-6F06-6A4B-A167-8B153ED90168}"/>
               </a:ext>
             </a:extLst>
           </p:cNvPr>
@@ -10903,7 +11677,43 @@
         </p:blipFill>
         <p:spPr>
           <a:xfrm>
-            <a:off x="9371757" y="679028"/>
+            <a:off x="783656" y="2240663"/>
+            <a:ext cx="4808133" cy="3606099"/>
+          </a:xfrm>
+          <a:prstGeom prst="rect">
+            <a:avLst/>
+          </a:prstGeom>
+        </p:spPr>
+      </p:pic>
+      <p:pic>
+        <p:nvPicPr>
+          <p:cNvPr id="6" name="Graphique 4" descr="Masculin avec un remplissage uni">
+            <a:extLst>
+              <a:ext uri="{FF2B5EF4-FFF2-40B4-BE49-F238E27FC236}">
+                <a16:creationId xmlns:a16="http://schemas.microsoft.com/office/drawing/2014/main" id="{4A3D1017-638D-6C4D-83BE-9982E5B9A284}"/>
+              </a:ext>
+            </a:extLst>
+          </p:cNvPr>
+          <p:cNvPicPr>
+            <a:picLocks noChangeAspect="1"/>
+          </p:cNvPicPr>
+          <p:nvPr/>
+        </p:nvPicPr>
+        <p:blipFill>
+          <a:blip r:embed="rId5">
+            <a:extLst>
+              <a:ext uri="{96DAC541-7B7A-43D3-8B79-37D633B846F1}">
+                <asvg:svgBlip xmlns:asvg="http://schemas.microsoft.com/office/drawing/2016/SVG/main" r:embed="rId6"/>
+              </a:ext>
+            </a:extLst>
+          </a:blip>
+          <a:stretch>
+            <a:fillRect/>
+          </a:stretch>
+        </p:blipFill>
+        <p:spPr>
+          <a:xfrm>
+            <a:off x="-59367" y="3315662"/>
             <a:ext cx="914400" cy="914400"/>
           </a:xfrm>
           <a:prstGeom prst="rect">
@@ -10916,7 +11726,7 @@
           <p:cNvPr id="7" name="Image 6">
             <a:extLst>
               <a:ext uri="{FF2B5EF4-FFF2-40B4-BE49-F238E27FC236}">
-                <a16:creationId xmlns:a16="http://schemas.microsoft.com/office/drawing/2014/main" id="{A5AC15E0-82C0-46F7-B4F8-180A39E42F93}"/>
+                <a16:creationId xmlns:a16="http://schemas.microsoft.com/office/drawing/2014/main" id="{F6F2E704-04D9-2644-BE9F-06977A9B5B88}"/>
               </a:ext>
             </a:extLst>
           </p:cNvPr>
@@ -10926,7 +11736,7 @@
           <p:nvPr/>
         </p:nvPicPr>
         <p:blipFill>
-          <a:blip r:embed="rId5">
+          <a:blip r:embed="rId7">
             <a:lum bright="70000" contrast="-70000"/>
           </a:blip>
           <a:stretch>
@@ -10935,8 +11745,44 @@
         </p:blipFill>
         <p:spPr>
           <a:xfrm>
-            <a:off x="10174387" y="726231"/>
+            <a:off x="11372007" y="3315223"/>
             <a:ext cx="819993" cy="819993"/>
+          </a:xfrm>
+          <a:prstGeom prst="rect">
+            <a:avLst/>
+          </a:prstGeom>
+        </p:spPr>
+      </p:pic>
+      <p:pic>
+        <p:nvPicPr>
+          <p:cNvPr id="8" name="Graphic 7">
+            <a:extLst>
+              <a:ext uri="{FF2B5EF4-FFF2-40B4-BE49-F238E27FC236}">
+                <a16:creationId xmlns:a16="http://schemas.microsoft.com/office/drawing/2014/main" id="{832F28AD-1052-F84F-B277-7D9FC6616F93}"/>
+              </a:ext>
+            </a:extLst>
+          </p:cNvPr>
+          <p:cNvPicPr>
+            <a:picLocks noChangeAspect="1"/>
+          </p:cNvPicPr>
+          <p:nvPr/>
+        </p:nvPicPr>
+        <p:blipFill>
+          <a:blip r:embed="rId8">
+            <a:extLst>
+              <a:ext uri="{96DAC541-7B7A-43D3-8B79-37D633B846F1}">
+                <asvg:svgBlip xmlns:asvg="http://schemas.microsoft.com/office/drawing/2016/SVG/main" r:embed="rId9"/>
+              </a:ext>
+            </a:extLst>
+          </a:blip>
+          <a:stretch>
+            <a:fillRect/>
+          </a:stretch>
+        </p:blipFill>
+        <p:spPr>
+          <a:xfrm>
+            <a:off x="6481479" y="2228620"/>
+            <a:ext cx="4808133" cy="3606100"/>
           </a:xfrm>
           <a:prstGeom prst="rect">
             <a:avLst/>
@@ -10946,7 +11792,7 @@
     </p:spTree>
     <p:extLst>
       <p:ext uri="{BB962C8B-B14F-4D97-AF65-F5344CB8AC3E}">
-        <p14:creationId xmlns:p14="http://schemas.microsoft.com/office/powerpoint/2010/main" val="1311002320"/>
+        <p14:creationId xmlns:p14="http://schemas.microsoft.com/office/powerpoint/2010/main" val="410148669"/>
       </p:ext>
     </p:extLst>
   </p:cSld>

</xml_diff>